<commit_message>
HashSet needs to be defiend in Data Model. New way for testing: HashSetTest
</commit_message>
<xml_diff>
--- a/Design.pptx
+++ b/Design.pptx
@@ -10,13 +10,14 @@
     <p:sldId id="266" r:id="rId4"/>
     <p:sldId id="265" r:id="rId5"/>
     <p:sldId id="264" r:id="rId6"/>
-    <p:sldId id="267" r:id="rId7"/>
-    <p:sldId id="261" r:id="rId8"/>
-    <p:sldId id="256" r:id="rId9"/>
-    <p:sldId id="257" r:id="rId10"/>
-    <p:sldId id="259" r:id="rId11"/>
-    <p:sldId id="260" r:id="rId12"/>
-    <p:sldId id="258" r:id="rId13"/>
+    <p:sldId id="268" r:id="rId7"/>
+    <p:sldId id="267" r:id="rId8"/>
+    <p:sldId id="261" r:id="rId9"/>
+    <p:sldId id="256" r:id="rId10"/>
+    <p:sldId id="257" r:id="rId11"/>
+    <p:sldId id="259" r:id="rId12"/>
+    <p:sldId id="260" r:id="rId13"/>
+    <p:sldId id="258" r:id="rId14"/>
   </p:sldIdLst>
   <p:sldSz cx="9144000" cy="5143500" type="screen16x9"/>
   <p:notesSz cx="6858000" cy="9144000"/>
@@ -299,7 +300,7 @@
           <a:p>
             <a:fld id="{16D45444-3A16-465C-AD6C-0FB678B44574}" type="datetimeFigureOut">
               <a:rPr lang="en-GB" smtClean="0"/>
-              <a:t>04/05/2022</a:t>
+              <a:t>24/05/2022</a:t>
             </a:fld>
             <a:endParaRPr lang="en-GB"/>
           </a:p>
@@ -469,7 +470,7 @@
           <a:p>
             <a:fld id="{16D45444-3A16-465C-AD6C-0FB678B44574}" type="datetimeFigureOut">
               <a:rPr lang="en-GB" smtClean="0"/>
-              <a:t>04/05/2022</a:t>
+              <a:t>24/05/2022</a:t>
             </a:fld>
             <a:endParaRPr lang="en-GB"/>
           </a:p>
@@ -649,7 +650,7 @@
           <a:p>
             <a:fld id="{16D45444-3A16-465C-AD6C-0FB678B44574}" type="datetimeFigureOut">
               <a:rPr lang="en-GB" smtClean="0"/>
-              <a:t>04/05/2022</a:t>
+              <a:t>24/05/2022</a:t>
             </a:fld>
             <a:endParaRPr lang="en-GB"/>
           </a:p>
@@ -819,7 +820,7 @@
           <a:p>
             <a:fld id="{16D45444-3A16-465C-AD6C-0FB678B44574}" type="datetimeFigureOut">
               <a:rPr lang="en-GB" smtClean="0"/>
-              <a:t>04/05/2022</a:t>
+              <a:t>24/05/2022</a:t>
             </a:fld>
             <a:endParaRPr lang="en-GB"/>
           </a:p>
@@ -1065,7 +1066,7 @@
           <a:p>
             <a:fld id="{16D45444-3A16-465C-AD6C-0FB678B44574}" type="datetimeFigureOut">
               <a:rPr lang="en-GB" smtClean="0"/>
-              <a:t>04/05/2022</a:t>
+              <a:t>24/05/2022</a:t>
             </a:fld>
             <a:endParaRPr lang="en-GB"/>
           </a:p>
@@ -1353,7 +1354,7 @@
           <a:p>
             <a:fld id="{16D45444-3A16-465C-AD6C-0FB678B44574}" type="datetimeFigureOut">
               <a:rPr lang="en-GB" smtClean="0"/>
-              <a:t>04/05/2022</a:t>
+              <a:t>24/05/2022</a:t>
             </a:fld>
             <a:endParaRPr lang="en-GB"/>
           </a:p>
@@ -1775,7 +1776,7 @@
           <a:p>
             <a:fld id="{16D45444-3A16-465C-AD6C-0FB678B44574}" type="datetimeFigureOut">
               <a:rPr lang="en-GB" smtClean="0"/>
-              <a:t>04/05/2022</a:t>
+              <a:t>24/05/2022</a:t>
             </a:fld>
             <a:endParaRPr lang="en-GB"/>
           </a:p>
@@ -1893,7 +1894,7 @@
           <a:p>
             <a:fld id="{16D45444-3A16-465C-AD6C-0FB678B44574}" type="datetimeFigureOut">
               <a:rPr lang="en-GB" smtClean="0"/>
-              <a:t>04/05/2022</a:t>
+              <a:t>24/05/2022</a:t>
             </a:fld>
             <a:endParaRPr lang="en-GB"/>
           </a:p>
@@ -1988,7 +1989,7 @@
           <a:p>
             <a:fld id="{16D45444-3A16-465C-AD6C-0FB678B44574}" type="datetimeFigureOut">
               <a:rPr lang="en-GB" smtClean="0"/>
-              <a:t>04/05/2022</a:t>
+              <a:t>24/05/2022</a:t>
             </a:fld>
             <a:endParaRPr lang="en-GB"/>
           </a:p>
@@ -2265,7 +2266,7 @@
           <a:p>
             <a:fld id="{16D45444-3A16-465C-AD6C-0FB678B44574}" type="datetimeFigureOut">
               <a:rPr lang="en-GB" smtClean="0"/>
-              <a:t>04/05/2022</a:t>
+              <a:t>24/05/2022</a:t>
             </a:fld>
             <a:endParaRPr lang="en-GB"/>
           </a:p>
@@ -2518,7 +2519,7 @@
           <a:p>
             <a:fld id="{16D45444-3A16-465C-AD6C-0FB678B44574}" type="datetimeFigureOut">
               <a:rPr lang="en-GB" smtClean="0"/>
-              <a:t>04/05/2022</a:t>
+              <a:t>24/05/2022</a:t>
             </a:fld>
             <a:endParaRPr lang="en-GB"/>
           </a:p>
@@ -2731,7 +2732,7 @@
           <a:p>
             <a:fld id="{16D45444-3A16-465C-AD6C-0FB678B44574}" type="datetimeFigureOut">
               <a:rPr lang="en-GB" smtClean="0"/>
-              <a:t>04/05/2022</a:t>
+              <a:t>24/05/2022</a:t>
             </a:fld>
             <a:endParaRPr lang="en-GB"/>
           </a:p>
@@ -3420,6 +3421,435 @@
 </file>
 
 <file path=ppt/slides/slide10.xml><?xml version="1.0" encoding="utf-8"?>
+<p:sld xmlns:a="http://schemas.openxmlformats.org/drawingml/2006/main" xmlns:r="http://schemas.openxmlformats.org/officeDocument/2006/relationships" xmlns:p="http://schemas.openxmlformats.org/presentationml/2006/main">
+  <p:cSld>
+    <p:spTree>
+      <p:nvGrpSpPr>
+        <p:cNvPr id="1" name=""/>
+        <p:cNvGrpSpPr/>
+        <p:nvPr/>
+      </p:nvGrpSpPr>
+      <p:grpSpPr>
+        <a:xfrm>
+          <a:off x="0" y="0"/>
+          <a:ext cx="0" cy="0"/>
+          <a:chOff x="0" y="0"/>
+          <a:chExt cx="0" cy="0"/>
+        </a:xfrm>
+      </p:grpSpPr>
+      <p:sp>
+        <p:nvSpPr>
+          <p:cNvPr id="7" name="TextBox 6"/>
+          <p:cNvSpPr txBox="1"/>
+          <p:nvPr/>
+        </p:nvSpPr>
+        <p:spPr>
+          <a:xfrm>
+            <a:off x="3275857" y="465517"/>
+            <a:ext cx="987195" cy="646331"/>
+          </a:xfrm>
+          <a:prstGeom prst="rect">
+            <a:avLst/>
+          </a:prstGeom>
+        </p:spPr>
+        <p:style>
+          <a:lnRef idx="1">
+            <a:schemeClr val="dk1"/>
+          </a:lnRef>
+          <a:fillRef idx="2">
+            <a:schemeClr val="dk1"/>
+          </a:fillRef>
+          <a:effectRef idx="1">
+            <a:schemeClr val="dk1"/>
+          </a:effectRef>
+          <a:fontRef idx="minor">
+            <a:schemeClr val="dk1"/>
+          </a:fontRef>
+        </p:style>
+        <p:txBody>
+          <a:bodyPr wrap="square" rtlCol="0">
+            <a:spAutoFit/>
+          </a:bodyPr>
+          <a:lstStyle/>
+          <a:p>
+            <a:r>
+              <a:rPr lang="en-GB" b="1" dirty="0" smtClean="0"/>
+              <a:t>Parent</a:t>
+            </a:r>
+          </a:p>
+          <a:p>
+            <a:r>
+              <a:rPr lang="en-GB" dirty="0" smtClean="0"/>
+              <a:t>Children</a:t>
+            </a:r>
+            <a:endParaRPr lang="en-GB" dirty="0"/>
+          </a:p>
+        </p:txBody>
+      </p:sp>
+      <p:sp>
+        <p:nvSpPr>
+          <p:cNvPr id="8" name="TextBox 7"/>
+          <p:cNvSpPr txBox="1"/>
+          <p:nvPr/>
+        </p:nvSpPr>
+        <p:spPr>
+          <a:xfrm>
+            <a:off x="3907366" y="1437624"/>
+            <a:ext cx="987195" cy="923330"/>
+          </a:xfrm>
+          <a:prstGeom prst="rect">
+            <a:avLst/>
+          </a:prstGeom>
+        </p:spPr>
+        <p:style>
+          <a:lnRef idx="1">
+            <a:schemeClr val="dk1"/>
+          </a:lnRef>
+          <a:fillRef idx="2">
+            <a:schemeClr val="dk1"/>
+          </a:fillRef>
+          <a:effectRef idx="1">
+            <a:schemeClr val="dk1"/>
+          </a:effectRef>
+          <a:fontRef idx="minor">
+            <a:schemeClr val="dk1"/>
+          </a:fontRef>
+        </p:style>
+        <p:txBody>
+          <a:bodyPr wrap="square" rtlCol="0">
+            <a:spAutoFit/>
+          </a:bodyPr>
+          <a:lstStyle/>
+          <a:p>
+            <a:r>
+              <a:rPr lang="en-GB" b="1" dirty="0" smtClean="0"/>
+              <a:t>Child</a:t>
+            </a:r>
+          </a:p>
+          <a:p>
+            <a:r>
+              <a:rPr lang="en-GB" dirty="0" smtClean="0"/>
+              <a:t>Parent1</a:t>
+            </a:r>
+          </a:p>
+          <a:p>
+            <a:r>
+              <a:rPr lang="en-GB" dirty="0" smtClean="0"/>
+              <a:t>Parent2</a:t>
+            </a:r>
+          </a:p>
+        </p:txBody>
+      </p:sp>
+      <p:cxnSp>
+        <p:nvCxnSpPr>
+          <p:cNvPr id="9" name="Straight Arrow Connector 8"/>
+          <p:cNvCxnSpPr>
+            <a:stCxn id="7" idx="2"/>
+            <a:endCxn id="8" idx="0"/>
+          </p:cNvCxnSpPr>
+          <p:nvPr/>
+        </p:nvCxnSpPr>
+        <p:spPr>
+          <a:xfrm>
+            <a:off x="3769455" y="1111848"/>
+            <a:ext cx="631509" cy="325776"/>
+          </a:xfrm>
+          <a:prstGeom prst="straightConnector1">
+            <a:avLst/>
+          </a:prstGeom>
+          <a:ln>
+            <a:tailEnd type="arrow"/>
+          </a:ln>
+        </p:spPr>
+        <p:style>
+          <a:lnRef idx="1">
+            <a:schemeClr val="accent1"/>
+          </a:lnRef>
+          <a:fillRef idx="0">
+            <a:schemeClr val="accent1"/>
+          </a:fillRef>
+          <a:effectRef idx="0">
+            <a:schemeClr val="accent1"/>
+          </a:effectRef>
+          <a:fontRef idx="minor">
+            <a:schemeClr val="tx1"/>
+          </a:fontRef>
+        </p:style>
+      </p:cxnSp>
+      <p:sp>
+        <p:nvSpPr>
+          <p:cNvPr id="10" name="TextBox 9"/>
+          <p:cNvSpPr txBox="1"/>
+          <p:nvPr/>
+        </p:nvSpPr>
+        <p:spPr>
+          <a:xfrm>
+            <a:off x="179513" y="627534"/>
+            <a:ext cx="3594895" cy="1200329"/>
+          </a:xfrm>
+          <a:prstGeom prst="rect">
+            <a:avLst/>
+          </a:prstGeom>
+          <a:noFill/>
+        </p:spPr>
+        <p:txBody>
+          <a:bodyPr wrap="none" rtlCol="0">
+            <a:spAutoFit/>
+          </a:bodyPr>
+          <a:lstStyle/>
+          <a:p>
+            <a:r>
+              <a:rPr lang="en-GB" dirty="0" err="1" smtClean="0"/>
+              <a:t>createStore</a:t>
+            </a:r>
+            <a:r>
+              <a:rPr lang="en-GB" dirty="0" smtClean="0"/>
+              <a:t>(Parent1)</a:t>
+            </a:r>
+          </a:p>
+          <a:p>
+            <a:r>
+              <a:rPr lang="en-GB" dirty="0" err="1" smtClean="0"/>
+              <a:t>createStore</a:t>
+            </a:r>
+            <a:r>
+              <a:rPr lang="en-GB" dirty="0" smtClean="0"/>
+              <a:t>(Parent2)</a:t>
+            </a:r>
+          </a:p>
+          <a:p>
+            <a:r>
+              <a:rPr lang="en-GB" dirty="0" err="1" smtClean="0"/>
+              <a:t>createStore</a:t>
+            </a:r>
+            <a:r>
+              <a:rPr lang="en-GB" dirty="0" smtClean="0"/>
+              <a:t>(Child(Parent1, Parent2))</a:t>
+            </a:r>
+          </a:p>
+          <a:p>
+            <a:r>
+              <a:rPr lang="en-GB" dirty="0" smtClean="0"/>
+              <a:t> adds Child to Parent1 and Parent2</a:t>
+            </a:r>
+            <a:endParaRPr lang="en-GB" dirty="0"/>
+          </a:p>
+        </p:txBody>
+      </p:sp>
+      <p:sp>
+        <p:nvSpPr>
+          <p:cNvPr id="11" name="TextBox 10"/>
+          <p:cNvSpPr txBox="1"/>
+          <p:nvPr/>
+        </p:nvSpPr>
+        <p:spPr>
+          <a:xfrm>
+            <a:off x="323528" y="2988697"/>
+            <a:ext cx="8640960" cy="2031325"/>
+          </a:xfrm>
+          <a:prstGeom prst="rect">
+            <a:avLst/>
+          </a:prstGeom>
+          <a:noFill/>
+        </p:spPr>
+        <p:txBody>
+          <a:bodyPr wrap="square" rtlCol="0">
+            <a:spAutoFit/>
+          </a:bodyPr>
+          <a:lstStyle/>
+          <a:p>
+            <a:r>
+              <a:rPr lang="en-GB" dirty="0" smtClean="0"/>
+              <a:t>Unfortunately, there are to many strange cases to be solved, when a not stored child can be added to a not stored parent, for example if the child belongs to 2 parents. If it has only 1 parent, the child could get saved when the parent gets saved. But when it has 2 parents and the first parent tries to save the child before the second parent is saved, that wouldn’t work, because parent 2 has to be saved before child 2 can get saved, which needs to know the key of parent 2.</a:t>
+            </a:r>
+          </a:p>
+          <a:p>
+            <a:endParaRPr lang="en-GB" dirty="0"/>
+          </a:p>
+        </p:txBody>
+      </p:sp>
+      <p:sp>
+        <p:nvSpPr>
+          <p:cNvPr id="12" name="TextBox 11"/>
+          <p:cNvSpPr txBox="1"/>
+          <p:nvPr/>
+        </p:nvSpPr>
+        <p:spPr>
+          <a:xfrm>
+            <a:off x="4520910" y="465517"/>
+            <a:ext cx="987195" cy="646331"/>
+          </a:xfrm>
+          <a:prstGeom prst="rect">
+            <a:avLst/>
+          </a:prstGeom>
+        </p:spPr>
+        <p:style>
+          <a:lnRef idx="1">
+            <a:schemeClr val="dk1"/>
+          </a:lnRef>
+          <a:fillRef idx="2">
+            <a:schemeClr val="dk1"/>
+          </a:fillRef>
+          <a:effectRef idx="1">
+            <a:schemeClr val="dk1"/>
+          </a:effectRef>
+          <a:fontRef idx="minor">
+            <a:schemeClr val="dk1"/>
+          </a:fontRef>
+        </p:style>
+        <p:txBody>
+          <a:bodyPr wrap="square" rtlCol="0">
+            <a:spAutoFit/>
+          </a:bodyPr>
+          <a:lstStyle/>
+          <a:p>
+            <a:r>
+              <a:rPr lang="en-GB" b="1" dirty="0" smtClean="0"/>
+              <a:t>Parent</a:t>
+            </a:r>
+          </a:p>
+          <a:p>
+            <a:r>
+              <a:rPr lang="en-GB" dirty="0" smtClean="0"/>
+              <a:t>Children</a:t>
+            </a:r>
+            <a:endParaRPr lang="en-GB" dirty="0"/>
+          </a:p>
+        </p:txBody>
+      </p:sp>
+      <p:cxnSp>
+        <p:nvCxnSpPr>
+          <p:cNvPr id="13" name="Straight Arrow Connector 12"/>
+          <p:cNvCxnSpPr>
+            <a:stCxn id="12" idx="2"/>
+            <a:endCxn id="8" idx="0"/>
+          </p:cNvCxnSpPr>
+          <p:nvPr/>
+        </p:nvCxnSpPr>
+        <p:spPr>
+          <a:xfrm flipH="1">
+            <a:off x="4400964" y="1111848"/>
+            <a:ext cx="613544" cy="325776"/>
+          </a:xfrm>
+          <a:prstGeom prst="straightConnector1">
+            <a:avLst/>
+          </a:prstGeom>
+          <a:ln>
+            <a:tailEnd type="arrow"/>
+          </a:ln>
+        </p:spPr>
+        <p:style>
+          <a:lnRef idx="1">
+            <a:schemeClr val="accent1"/>
+          </a:lnRef>
+          <a:fillRef idx="0">
+            <a:schemeClr val="accent1"/>
+          </a:fillRef>
+          <a:effectRef idx="0">
+            <a:schemeClr val="accent1"/>
+          </a:effectRef>
+          <a:fontRef idx="minor">
+            <a:schemeClr val="tx1"/>
+          </a:fontRef>
+        </p:style>
+      </p:cxnSp>
+      <p:sp>
+        <p:nvSpPr>
+          <p:cNvPr id="14" name="TextBox 13"/>
+          <p:cNvSpPr txBox="1"/>
+          <p:nvPr/>
+        </p:nvSpPr>
+        <p:spPr>
+          <a:xfrm>
+            <a:off x="5657626" y="627534"/>
+            <a:ext cx="3430811" cy="2308324"/>
+          </a:xfrm>
+          <a:prstGeom prst="rect">
+            <a:avLst/>
+          </a:prstGeom>
+          <a:noFill/>
+        </p:spPr>
+        <p:txBody>
+          <a:bodyPr wrap="none" rtlCol="0">
+            <a:spAutoFit/>
+          </a:bodyPr>
+          <a:lstStyle/>
+          <a:p>
+            <a:r>
+              <a:rPr lang="en-GB" dirty="0" smtClean="0"/>
+              <a:t>create (Parent1)</a:t>
+            </a:r>
+          </a:p>
+          <a:p>
+            <a:r>
+              <a:rPr lang="en-GB" dirty="0"/>
+              <a:t>s</a:t>
+            </a:r>
+            <a:r>
+              <a:rPr lang="en-GB" dirty="0" smtClean="0"/>
+              <a:t>tore(Parent1)</a:t>
+            </a:r>
+          </a:p>
+          <a:p>
+            <a:r>
+              <a:rPr lang="en-GB" dirty="0" smtClean="0"/>
+              <a:t>create (Parent2)</a:t>
+            </a:r>
+          </a:p>
+          <a:p>
+            <a:r>
+              <a:rPr lang="en-GB" dirty="0" smtClean="0"/>
+              <a:t>create (Child(Parent1, Parent2))</a:t>
+            </a:r>
+          </a:p>
+          <a:p>
+            <a:r>
+              <a:rPr lang="en-GB" dirty="0" smtClean="0"/>
+              <a:t>/*store child not possible*/</a:t>
+            </a:r>
+          </a:p>
+          <a:p>
+            <a:r>
+              <a:rPr lang="en-GB" dirty="0" smtClean="0"/>
+              <a:t>store(Parent2)</a:t>
+            </a:r>
+          </a:p>
+          <a:p>
+            <a:r>
+              <a:rPr lang="en-GB" dirty="0" smtClean="0"/>
+              <a:t>store(Child)</a:t>
+            </a:r>
+          </a:p>
+          <a:p>
+            <a:r>
+              <a:rPr lang="en-GB" dirty="0" smtClean="0"/>
+              <a:t> adds Child to Parent1 and Parent2</a:t>
+            </a:r>
+            <a:endParaRPr lang="en-GB" dirty="0"/>
+          </a:p>
+        </p:txBody>
+      </p:sp>
+    </p:spTree>
+    <p:extLst>
+      <p:ext uri="{BB962C8B-B14F-4D97-AF65-F5344CB8AC3E}">
+        <p14:creationId xmlns:p14="http://schemas.microsoft.com/office/powerpoint/2010/main" val="1310231843"/>
+      </p:ext>
+    </p:extLst>
+  </p:cSld>
+  <p:clrMapOvr>
+    <a:masterClrMapping/>
+  </p:clrMapOvr>
+  <p:timing>
+    <p:tnLst>
+      <p:par>
+        <p:cTn id="1" dur="indefinite" restart="never" nodeType="tmRoot"/>
+      </p:par>
+    </p:tnLst>
+  </p:timing>
+</p:sld>
+</file>
+
+<file path=ppt/slides/slide11.xml><?xml version="1.0" encoding="utf-8"?>
 <p:sld xmlns:a="http://schemas.openxmlformats.org/drawingml/2006/main" xmlns:r="http://schemas.openxmlformats.org/officeDocument/2006/relationships" xmlns:p="http://schemas.openxmlformats.org/presentationml/2006/main">
   <p:cSld>
     <p:spTree>
@@ -6715,7 +7145,7 @@
 </p:sld>
 </file>
 
-<file path=ppt/slides/slide11.xml><?xml version="1.0" encoding="utf-8"?>
+<file path=ppt/slides/slide12.xml><?xml version="1.0" encoding="utf-8"?>
 <p:sld xmlns:a="http://schemas.openxmlformats.org/drawingml/2006/main" xmlns:r="http://schemas.openxmlformats.org/officeDocument/2006/relationships" xmlns:p="http://schemas.openxmlformats.org/presentationml/2006/main">
   <p:cSld>
     <p:spTree>
@@ -10697,7 +11127,7 @@
 </p:sld>
 </file>
 
-<file path=ppt/slides/slide12.xml><?xml version="1.0" encoding="utf-8"?>
+<file path=ppt/slides/slide13.xml><?xml version="1.0" encoding="utf-8"?>
 <p:sld xmlns:a="http://schemas.openxmlformats.org/drawingml/2006/main" xmlns:r="http://schemas.openxmlformats.org/officeDocument/2006/relationships" xmlns:p="http://schemas.openxmlformats.org/presentationml/2006/main">
   <p:cSld>
     <p:spTree>
@@ -17165,14 +17595,98 @@
       </p:grpSpPr>
       <p:sp>
         <p:nvSpPr>
+          <p:cNvPr id="21" name="Rectangle 20"/>
+          <p:cNvSpPr/>
+          <p:nvPr/>
+        </p:nvSpPr>
+        <p:spPr>
+          <a:xfrm>
+            <a:off x="2411760" y="318016"/>
+            <a:ext cx="3888432" cy="4413974"/>
+          </a:xfrm>
+          <a:prstGeom prst="rect">
+            <a:avLst/>
+          </a:prstGeom>
+        </p:spPr>
+        <p:style>
+          <a:lnRef idx="1">
+            <a:schemeClr val="dk1"/>
+          </a:lnRef>
+          <a:fillRef idx="2">
+            <a:schemeClr val="dk1"/>
+          </a:fillRef>
+          <a:effectRef idx="1">
+            <a:schemeClr val="dk1"/>
+          </a:effectRef>
+          <a:fontRef idx="minor">
+            <a:schemeClr val="dk1"/>
+          </a:fontRef>
+        </p:style>
+        <p:txBody>
+          <a:bodyPr rtlCol="0" anchor="t"/>
+          <a:lstStyle/>
+          <a:p>
+            <a:pPr algn="ctr"/>
+            <a:r>
+              <a:rPr lang="en-SG" dirty="0" smtClean="0"/>
+              <a:t>Branches</a:t>
+            </a:r>
+            <a:endParaRPr lang="en-SG" dirty="0"/>
+          </a:p>
+        </p:txBody>
+      </p:sp>
+      <p:sp>
+        <p:nvSpPr>
+          <p:cNvPr id="2" name="Rectangle 1"/>
+          <p:cNvSpPr/>
+          <p:nvPr/>
+        </p:nvSpPr>
+        <p:spPr>
+          <a:xfrm>
+            <a:off x="179512" y="318016"/>
+            <a:ext cx="1944216" cy="4413974"/>
+          </a:xfrm>
+          <a:prstGeom prst="rect">
+            <a:avLst/>
+          </a:prstGeom>
+        </p:spPr>
+        <p:style>
+          <a:lnRef idx="1">
+            <a:schemeClr val="dk1"/>
+          </a:lnRef>
+          <a:fillRef idx="2">
+            <a:schemeClr val="dk1"/>
+          </a:fillRef>
+          <a:effectRef idx="1">
+            <a:schemeClr val="dk1"/>
+          </a:effectRef>
+          <a:fontRef idx="minor">
+            <a:schemeClr val="dk1"/>
+          </a:fontRef>
+        </p:style>
+        <p:txBody>
+          <a:bodyPr rtlCol="0" anchor="t"/>
+          <a:lstStyle/>
+          <a:p>
+            <a:pPr algn="ctr"/>
+            <a:r>
+              <a:rPr lang="en-SG" dirty="0" smtClean="0"/>
+              <a:t>Roots</a:t>
+            </a:r>
+            <a:endParaRPr lang="en-SG" dirty="0"/>
+          </a:p>
+        </p:txBody>
+      </p:sp>
+      <p:sp>
+        <p:nvSpPr>
           <p:cNvPr id="4" name="Rectangle 3"/>
           <p:cNvSpPr/>
           <p:nvPr/>
         </p:nvSpPr>
         <p:spPr>
           <a:xfrm>
-            <a:off x="2987824" y="1045116"/>
-            <a:ext cx="1512168" cy="950570"/>
+            <a:off x="395536" y="1045116"/>
+            <a:ext cx="1512168" cy="734546"/>
           </a:xfrm>
           <a:prstGeom prst="rect">
             <a:avLst/>
@@ -17198,44 +17712,38 @@
           <a:p>
             <a:r>
               <a:rPr lang="en-SG" sz="1000" b="1" dirty="0" smtClean="0"/>
-              <a:t>Person </a:t>
-            </a:r>
-          </a:p>
-          <a:p>
-            <a:r>
-              <a:rPr lang="en-SG" sz="1000" dirty="0" smtClean="0"/>
-              <a:t>Person </a:t>
-            </a:r>
-            <a:r>
-              <a:rPr lang="en-SG" sz="1000" b="1" dirty="0"/>
-              <a:t>Father</a:t>
-            </a:r>
-            <a:r>
-              <a:rPr lang="en-SG" sz="1000" dirty="0"/>
-              <a:t> </a:t>
-            </a:r>
-            <a:endParaRPr lang="en-SG" sz="1000" dirty="0" smtClean="0"/>
-          </a:p>
-          <a:p>
-            <a:r>
-              <a:rPr lang="en-SG" sz="1000" dirty="0" smtClean="0"/>
-              <a:t>Person </a:t>
-            </a:r>
-            <a:r>
-              <a:rPr lang="en-SG" sz="1000" b="1" dirty="0" smtClean="0"/>
-              <a:t>Mother </a:t>
-            </a:r>
-          </a:p>
-          <a:p>
-            <a:r>
-              <a:rPr lang="en-SG" sz="1000" dirty="0" smtClean="0"/>
-              <a:t>Person </a:t>
-            </a:r>
-            <a:r>
-              <a:rPr lang="en-SG" sz="1000" b="1" dirty="0" smtClean="0"/>
-              <a:t>Partner</a:t>
-            </a:r>
-            <a:endParaRPr lang="en-SG" sz="1000" b="1" dirty="0"/>
+              <a:t>Node</a:t>
+            </a:r>
+            <a:endParaRPr lang="en-SG" sz="1000" b="1" dirty="0" smtClean="0"/>
+          </a:p>
+          <a:p>
+            <a:r>
+              <a:rPr lang="en-SG" sz="1000" dirty="0" smtClean="0">
+                <a:solidFill>
+                  <a:schemeClr val="bg1">
+                    <a:lumMod val="50000"/>
+                  </a:schemeClr>
+                </a:solidFill>
+              </a:rPr>
+              <a:t>Node </a:t>
+            </a:r>
+            <a:r>
+              <a:rPr lang="en-SG" sz="1000" b="1" dirty="0" smtClean="0">
+                <a:solidFill>
+                  <a:schemeClr val="bg1">
+                    <a:lumMod val="50000"/>
+                  </a:schemeClr>
+                </a:solidFill>
+              </a:rPr>
+              <a:t>Parent</a:t>
+            </a:r>
+            <a:endParaRPr lang="en-SG" sz="1000" dirty="0" smtClean="0">
+              <a:solidFill>
+                <a:schemeClr val="bg1">
+                  <a:lumMod val="50000"/>
+                </a:schemeClr>
+              </a:solidFill>
+            </a:endParaRPr>
           </a:p>
         </p:txBody>
       </p:sp>
@@ -17247,7 +17755,7 @@
         </p:nvSpPr>
         <p:spPr>
           <a:xfrm>
-            <a:off x="3059832" y="1707654"/>
+            <a:off x="467544" y="1419622"/>
             <a:ext cx="1368151" cy="246221"/>
           </a:xfrm>
           <a:prstGeom prst="rect">
@@ -17303,14 +17811,86 @@
       </p:sp>
       <p:sp>
         <p:nvSpPr>
-          <p:cNvPr id="6" name="Rectangle 5"/>
+          <p:cNvPr id="33" name="TextBox 32"/>
+          <p:cNvSpPr txBox="1"/>
+          <p:nvPr/>
+        </p:nvSpPr>
+        <p:spPr>
+          <a:xfrm>
+            <a:off x="-36512" y="-20538"/>
+            <a:ext cx="545983" cy="338554"/>
+          </a:xfrm>
+          <a:prstGeom prst="rect">
+            <a:avLst/>
+          </a:prstGeom>
+          <a:noFill/>
+        </p:spPr>
+        <p:txBody>
+          <a:bodyPr wrap="none" rtlCol="0">
+            <a:spAutoFit/>
+          </a:bodyPr>
+          <a:lstStyle/>
+          <a:p>
+            <a:r>
+              <a:rPr lang="en-SG" sz="1600" dirty="0" smtClean="0"/>
+              <a:t>Tree</a:t>
+            </a:r>
+            <a:endParaRPr lang="en-SG" sz="1600" dirty="0"/>
+          </a:p>
+        </p:txBody>
+      </p:sp>
+      <p:sp>
+        <p:nvSpPr>
+          <p:cNvPr id="23" name="Rectangle 22"/>
           <p:cNvSpPr/>
           <p:nvPr/>
         </p:nvSpPr>
         <p:spPr>
           <a:xfrm>
-            <a:off x="2987824" y="2341260"/>
-            <a:ext cx="1512168" cy="950570"/>
+            <a:off x="6660232" y="318016"/>
+            <a:ext cx="1944216" cy="4413974"/>
+          </a:xfrm>
+          <a:prstGeom prst="rect">
+            <a:avLst/>
+          </a:prstGeom>
+        </p:spPr>
+        <p:style>
+          <a:lnRef idx="1">
+            <a:schemeClr val="dk1"/>
+          </a:lnRef>
+          <a:fillRef idx="2">
+            <a:schemeClr val="dk1"/>
+          </a:fillRef>
+          <a:effectRef idx="1">
+            <a:schemeClr val="dk1"/>
+          </a:effectRef>
+          <a:fontRef idx="minor">
+            <a:schemeClr val="dk1"/>
+          </a:fontRef>
+        </p:style>
+        <p:txBody>
+          <a:bodyPr rtlCol="0" anchor="t"/>
+          <a:lstStyle/>
+          <a:p>
+            <a:pPr algn="ctr"/>
+            <a:r>
+              <a:rPr lang="en-SG" dirty="0" smtClean="0"/>
+              <a:t>Leaves</a:t>
+            </a:r>
+            <a:endParaRPr lang="en-SG" dirty="0"/>
+          </a:p>
+        </p:txBody>
+      </p:sp>
+      <p:sp>
+        <p:nvSpPr>
+          <p:cNvPr id="26" name="Rectangle 25"/>
+          <p:cNvSpPr/>
+          <p:nvPr/>
+        </p:nvSpPr>
+        <p:spPr>
+          <a:xfrm>
+            <a:off x="395536" y="3205356"/>
+            <a:ext cx="1512168" cy="734546"/>
           </a:xfrm>
           <a:prstGeom prst="rect">
             <a:avLst/>
@@ -17336,56 +17916,50 @@
           <a:p>
             <a:r>
               <a:rPr lang="en-SG" sz="1000" b="1" dirty="0" smtClean="0"/>
-              <a:t>Person </a:t>
-            </a:r>
-          </a:p>
-          <a:p>
-            <a:r>
-              <a:rPr lang="en-SG" sz="1000" dirty="0" smtClean="0"/>
-              <a:t>Person </a:t>
-            </a:r>
-            <a:r>
-              <a:rPr lang="en-SG" sz="1000" b="1" dirty="0"/>
-              <a:t>Father</a:t>
-            </a:r>
-            <a:r>
-              <a:rPr lang="en-SG" sz="1000" dirty="0"/>
-              <a:t> </a:t>
-            </a:r>
-            <a:endParaRPr lang="en-SG" sz="1000" dirty="0" smtClean="0"/>
-          </a:p>
-          <a:p>
-            <a:r>
-              <a:rPr lang="en-SG" sz="1000" dirty="0" smtClean="0"/>
-              <a:t>Person </a:t>
-            </a:r>
-            <a:r>
-              <a:rPr lang="en-SG" sz="1000" b="1" dirty="0" smtClean="0"/>
-              <a:t>Mother </a:t>
-            </a:r>
-          </a:p>
-          <a:p>
-            <a:r>
-              <a:rPr lang="en-SG" sz="1000" dirty="0" smtClean="0"/>
-              <a:t>Person </a:t>
-            </a:r>
-            <a:r>
-              <a:rPr lang="en-SG" sz="1000" b="1" dirty="0" smtClean="0"/>
-              <a:t>Partner</a:t>
-            </a:r>
-            <a:endParaRPr lang="en-SG" sz="1000" b="1" dirty="0"/>
-          </a:p>
-        </p:txBody>
-      </p:sp>
-      <p:sp>
-        <p:nvSpPr>
-          <p:cNvPr id="7" name="TextBox 6"/>
+              <a:t>Node</a:t>
+            </a:r>
+            <a:endParaRPr lang="en-SG" sz="1000" b="1" dirty="0" smtClean="0"/>
+          </a:p>
+          <a:p>
+            <a:r>
+              <a:rPr lang="en-SG" sz="1000" dirty="0" smtClean="0">
+                <a:solidFill>
+                  <a:schemeClr val="bg1">
+                    <a:lumMod val="50000"/>
+                  </a:schemeClr>
+                </a:solidFill>
+              </a:rPr>
+              <a:t>Node </a:t>
+            </a:r>
+            <a:r>
+              <a:rPr lang="en-SG" sz="1000" b="1" dirty="0" smtClean="0">
+                <a:solidFill>
+                  <a:schemeClr val="bg1">
+                    <a:lumMod val="50000"/>
+                  </a:schemeClr>
+                </a:solidFill>
+              </a:rPr>
+              <a:t>Parent</a:t>
+            </a:r>
+            <a:endParaRPr lang="en-SG" sz="1000" dirty="0" smtClean="0">
+              <a:solidFill>
+                <a:schemeClr val="bg1">
+                  <a:lumMod val="50000"/>
+                </a:schemeClr>
+              </a:solidFill>
+            </a:endParaRPr>
+          </a:p>
+        </p:txBody>
+      </p:sp>
+      <p:sp>
+        <p:nvSpPr>
+          <p:cNvPr id="28" name="TextBox 27"/>
           <p:cNvSpPr txBox="1"/>
           <p:nvPr/>
         </p:nvSpPr>
         <p:spPr>
           <a:xfrm>
-            <a:off x="3059832" y="3003798"/>
+            <a:off x="467544" y="3579862"/>
             <a:ext cx="1368151" cy="246221"/>
           </a:xfrm>
           <a:prstGeom prst="rect">
@@ -17441,14 +18015,14 @@
       </p:sp>
       <p:sp>
         <p:nvSpPr>
-          <p:cNvPr id="8" name="Rectangle 7"/>
+          <p:cNvPr id="29" name="Rectangle 28"/>
           <p:cNvSpPr/>
           <p:nvPr/>
         </p:nvSpPr>
         <p:spPr>
           <a:xfrm>
-            <a:off x="5148064" y="627534"/>
-            <a:ext cx="1512168" cy="950570"/>
+            <a:off x="2627784" y="843558"/>
+            <a:ext cx="1512168" cy="734546"/>
           </a:xfrm>
           <a:prstGeom prst="rect">
             <a:avLst/>
@@ -17474,57 +18048,107 @@
           <a:p>
             <a:r>
               <a:rPr lang="en-SG" sz="1000" b="1" dirty="0" smtClean="0"/>
-              <a:t>Person </a:t>
-            </a:r>
-          </a:p>
+              <a:t>Node</a:t>
+            </a:r>
+            <a:endParaRPr lang="en-SG" sz="1000" b="1" dirty="0" smtClean="0"/>
+          </a:p>
+          <a:p>
+            <a:r>
+              <a:rPr lang="en-SG" sz="1000" dirty="0" smtClean="0">
+                <a:solidFill>
+                  <a:schemeClr val="tx1"/>
+                </a:solidFill>
+              </a:rPr>
+              <a:t>Node </a:t>
+            </a:r>
+            <a:r>
+              <a:rPr lang="en-SG" sz="1000" b="1" dirty="0" smtClean="0">
+                <a:solidFill>
+                  <a:schemeClr val="tx1"/>
+                </a:solidFill>
+              </a:rPr>
+              <a:t>Parent</a:t>
+            </a:r>
+            <a:endParaRPr lang="en-SG" sz="1000" dirty="0" smtClean="0">
+              <a:solidFill>
+                <a:schemeClr val="tx1"/>
+              </a:solidFill>
+            </a:endParaRPr>
+          </a:p>
+        </p:txBody>
+      </p:sp>
+      <p:sp>
+        <p:nvSpPr>
+          <p:cNvPr id="34" name="TextBox 33"/>
+          <p:cNvSpPr txBox="1"/>
+          <p:nvPr/>
+        </p:nvSpPr>
+        <p:spPr>
+          <a:xfrm>
+            <a:off x="2699792" y="1218064"/>
+            <a:ext cx="1368151" cy="246221"/>
+          </a:xfrm>
+          <a:prstGeom prst="rect">
+            <a:avLst/>
+          </a:prstGeom>
+          <a:gradFill flip="none" rotWithShape="1">
+            <a:gsLst>
+              <a:gs pos="0">
+                <a:schemeClr val="accent1">
+                  <a:tint val="66000"/>
+                  <a:satMod val="160000"/>
+                </a:schemeClr>
+              </a:gs>
+              <a:gs pos="50000">
+                <a:schemeClr val="accent1">
+                  <a:tint val="44500"/>
+                  <a:satMod val="160000"/>
+                </a:schemeClr>
+              </a:gs>
+              <a:gs pos="100000">
+                <a:schemeClr val="accent1">
+                  <a:tint val="23500"/>
+                  <a:satMod val="160000"/>
+                </a:schemeClr>
+              </a:gs>
+            </a:gsLst>
+            <a:lin ang="16200000" scaled="1"/>
+            <a:tileRect/>
+          </a:gradFill>
+          <a:ln>
+            <a:solidFill>
+              <a:schemeClr val="accent1"/>
+            </a:solidFill>
+          </a:ln>
+        </p:spPr>
+        <p:txBody>
+          <a:bodyPr wrap="square" rtlCol="0">
+            <a:spAutoFit/>
+          </a:bodyPr>
+          <a:lstStyle/>
           <a:p>
             <a:r>
               <a:rPr lang="en-SG" sz="1000" dirty="0" smtClean="0"/>
-              <a:t>Person </a:t>
-            </a:r>
-            <a:r>
-              <a:rPr lang="en-SG" sz="1000" b="1" dirty="0"/>
-              <a:t>Father</a:t>
-            </a:r>
-            <a:r>
-              <a:rPr lang="en-SG" sz="1000" dirty="0"/>
-              <a:t> </a:t>
-            </a:r>
-            <a:endParaRPr lang="en-SG" sz="1000" dirty="0" smtClean="0"/>
-          </a:p>
-          <a:p>
-            <a:r>
-              <a:rPr lang="en-SG" sz="1000" dirty="0" smtClean="0"/>
-              <a:t>Person </a:t>
+              <a:t>List&lt;Person&gt;</a:t>
             </a:r>
             <a:r>
               <a:rPr lang="en-SG" sz="1000" b="1" dirty="0" smtClean="0"/>
-              <a:t>Mother </a:t>
-            </a:r>
-          </a:p>
-          <a:p>
-            <a:r>
-              <a:rPr lang="en-SG" sz="1000" dirty="0" smtClean="0"/>
-              <a:t>Person </a:t>
-            </a:r>
-            <a:r>
-              <a:rPr lang="en-SG" sz="1000" b="1" dirty="0" smtClean="0"/>
-              <a:t>Partner</a:t>
-            </a:r>
-            <a:endParaRPr lang="en-SG" sz="1000" b="1" dirty="0"/>
-          </a:p>
-        </p:txBody>
-      </p:sp>
-      <p:sp>
-        <p:nvSpPr>
-          <p:cNvPr id="9" name="Rectangle 8"/>
+              <a:t> Children</a:t>
+            </a:r>
+            <a:endParaRPr lang="en-SG" sz="1000" dirty="0"/>
+          </a:p>
+        </p:txBody>
+      </p:sp>
+      <p:sp>
+        <p:nvSpPr>
+          <p:cNvPr id="35" name="Rectangle 34"/>
           <p:cNvSpPr/>
           <p:nvPr/>
         </p:nvSpPr>
         <p:spPr>
           <a:xfrm>
-            <a:off x="5148064" y="1779662"/>
-            <a:ext cx="1512168" cy="950570"/>
+            <a:off x="4572000" y="685076"/>
+            <a:ext cx="1512168" cy="734546"/>
           </a:xfrm>
           <a:prstGeom prst="rect">
             <a:avLst/>
@@ -17550,57 +18174,107 @@
           <a:p>
             <a:r>
               <a:rPr lang="en-SG" sz="1000" b="1" dirty="0" smtClean="0"/>
-              <a:t>Person </a:t>
-            </a:r>
-          </a:p>
+              <a:t>Node</a:t>
+            </a:r>
+            <a:endParaRPr lang="en-SG" sz="1000" b="1" dirty="0" smtClean="0"/>
+          </a:p>
+          <a:p>
+            <a:r>
+              <a:rPr lang="en-SG" sz="1000" dirty="0" smtClean="0">
+                <a:solidFill>
+                  <a:schemeClr val="tx1"/>
+                </a:solidFill>
+              </a:rPr>
+              <a:t>Node </a:t>
+            </a:r>
+            <a:r>
+              <a:rPr lang="en-SG" sz="1000" b="1" dirty="0" smtClean="0">
+                <a:solidFill>
+                  <a:schemeClr val="tx1"/>
+                </a:solidFill>
+              </a:rPr>
+              <a:t>Parent</a:t>
+            </a:r>
+            <a:endParaRPr lang="en-SG" sz="1000" dirty="0" smtClean="0">
+              <a:solidFill>
+                <a:schemeClr val="tx1"/>
+              </a:solidFill>
+            </a:endParaRPr>
+          </a:p>
+        </p:txBody>
+      </p:sp>
+      <p:sp>
+        <p:nvSpPr>
+          <p:cNvPr id="36" name="TextBox 35"/>
+          <p:cNvSpPr txBox="1"/>
+          <p:nvPr/>
+        </p:nvSpPr>
+        <p:spPr>
+          <a:xfrm>
+            <a:off x="4644008" y="1059582"/>
+            <a:ext cx="1368151" cy="246221"/>
+          </a:xfrm>
+          <a:prstGeom prst="rect">
+            <a:avLst/>
+          </a:prstGeom>
+          <a:gradFill flip="none" rotWithShape="1">
+            <a:gsLst>
+              <a:gs pos="0">
+                <a:schemeClr val="accent1">
+                  <a:tint val="66000"/>
+                  <a:satMod val="160000"/>
+                </a:schemeClr>
+              </a:gs>
+              <a:gs pos="50000">
+                <a:schemeClr val="accent1">
+                  <a:tint val="44500"/>
+                  <a:satMod val="160000"/>
+                </a:schemeClr>
+              </a:gs>
+              <a:gs pos="100000">
+                <a:schemeClr val="accent1">
+                  <a:tint val="23500"/>
+                  <a:satMod val="160000"/>
+                </a:schemeClr>
+              </a:gs>
+            </a:gsLst>
+            <a:lin ang="16200000" scaled="1"/>
+            <a:tileRect/>
+          </a:gradFill>
+          <a:ln>
+            <a:solidFill>
+              <a:schemeClr val="accent1"/>
+            </a:solidFill>
+          </a:ln>
+        </p:spPr>
+        <p:txBody>
+          <a:bodyPr wrap="square" rtlCol="0">
+            <a:spAutoFit/>
+          </a:bodyPr>
+          <a:lstStyle/>
           <a:p>
             <a:r>
               <a:rPr lang="en-SG" sz="1000" dirty="0" smtClean="0"/>
-              <a:t>Person </a:t>
-            </a:r>
-            <a:r>
-              <a:rPr lang="en-SG" sz="1000" b="1" dirty="0"/>
-              <a:t>Father</a:t>
-            </a:r>
-            <a:r>
-              <a:rPr lang="en-SG" sz="1000" dirty="0"/>
-              <a:t> </a:t>
-            </a:r>
-            <a:endParaRPr lang="en-SG" sz="1000" dirty="0" smtClean="0"/>
-          </a:p>
-          <a:p>
-            <a:r>
-              <a:rPr lang="en-SG" sz="1000" dirty="0" smtClean="0"/>
-              <a:t>Person </a:t>
+              <a:t>List&lt;Person&gt;</a:t>
             </a:r>
             <a:r>
               <a:rPr lang="en-SG" sz="1000" b="1" dirty="0" smtClean="0"/>
-              <a:t>Mother </a:t>
-            </a:r>
-          </a:p>
-          <a:p>
-            <a:r>
-              <a:rPr lang="en-SG" sz="1000" dirty="0" smtClean="0"/>
-              <a:t>Person </a:t>
-            </a:r>
-            <a:r>
-              <a:rPr lang="en-SG" sz="1000" b="1" dirty="0" smtClean="0"/>
-              <a:t>Partner</a:t>
-            </a:r>
-            <a:endParaRPr lang="en-SG" sz="1000" b="1" dirty="0"/>
-          </a:p>
-        </p:txBody>
-      </p:sp>
-      <p:sp>
-        <p:nvSpPr>
-          <p:cNvPr id="10" name="Rectangle 9"/>
+              <a:t> Children</a:t>
+            </a:r>
+            <a:endParaRPr lang="en-SG" sz="1000" dirty="0"/>
+          </a:p>
+        </p:txBody>
+      </p:sp>
+      <p:sp>
+        <p:nvSpPr>
+          <p:cNvPr id="37" name="Rectangle 36"/>
           <p:cNvSpPr/>
           <p:nvPr/>
         </p:nvSpPr>
         <p:spPr>
           <a:xfrm>
-            <a:off x="5148064" y="2931790"/>
-            <a:ext cx="1512168" cy="950570"/>
+            <a:off x="6804248" y="685076"/>
+            <a:ext cx="1512168" cy="734546"/>
           </a:xfrm>
           <a:prstGeom prst="rect">
             <a:avLst/>
@@ -17626,8 +18300,1309 @@
           <a:p>
             <a:r>
               <a:rPr lang="en-SG" sz="1000" b="1" dirty="0" smtClean="0"/>
+              <a:t>Node</a:t>
+            </a:r>
+            <a:endParaRPr lang="en-SG" sz="1000" b="1" dirty="0" smtClean="0"/>
+          </a:p>
+          <a:p>
+            <a:r>
+              <a:rPr lang="en-SG" sz="1000" dirty="0" smtClean="0">
+                <a:solidFill>
+                  <a:schemeClr val="tx1"/>
+                </a:solidFill>
+              </a:rPr>
+              <a:t>Node </a:t>
+            </a:r>
+            <a:r>
+              <a:rPr lang="en-SG" sz="1000" b="1" dirty="0" smtClean="0">
+                <a:solidFill>
+                  <a:schemeClr val="tx1"/>
+                </a:solidFill>
+              </a:rPr>
+              <a:t>Parent</a:t>
+            </a:r>
+            <a:endParaRPr lang="en-SG" sz="1000" dirty="0" smtClean="0">
+              <a:solidFill>
+                <a:schemeClr val="tx1"/>
+              </a:solidFill>
+            </a:endParaRPr>
+          </a:p>
+        </p:txBody>
+      </p:sp>
+      <p:sp>
+        <p:nvSpPr>
+          <p:cNvPr id="38" name="TextBox 37"/>
+          <p:cNvSpPr txBox="1"/>
+          <p:nvPr/>
+        </p:nvSpPr>
+        <p:spPr>
+          <a:xfrm>
+            <a:off x="6876256" y="1069087"/>
+            <a:ext cx="1368151" cy="246221"/>
+          </a:xfrm>
+          <a:prstGeom prst="rect">
+            <a:avLst/>
+          </a:prstGeom>
+          <a:gradFill flip="none" rotWithShape="1">
+            <a:gsLst>
+              <a:gs pos="0">
+                <a:schemeClr val="accent1">
+                  <a:tint val="66000"/>
+                  <a:satMod val="160000"/>
+                </a:schemeClr>
+              </a:gs>
+              <a:gs pos="50000">
+                <a:schemeClr val="accent1">
+                  <a:tint val="44500"/>
+                  <a:satMod val="160000"/>
+                </a:schemeClr>
+              </a:gs>
+              <a:gs pos="100000">
+                <a:schemeClr val="accent1">
+                  <a:tint val="23500"/>
+                  <a:satMod val="160000"/>
+                </a:schemeClr>
+              </a:gs>
+            </a:gsLst>
+            <a:lin ang="16200000" scaled="1"/>
+            <a:tileRect/>
+          </a:gradFill>
+          <a:ln>
+            <a:solidFill>
+              <a:schemeClr val="accent1"/>
+            </a:solidFill>
+          </a:ln>
+        </p:spPr>
+        <p:txBody>
+          <a:bodyPr wrap="square" rtlCol="0">
+            <a:spAutoFit/>
+          </a:bodyPr>
+          <a:lstStyle/>
+          <a:p>
+            <a:r>
+              <a:rPr lang="en-SG" sz="1000" dirty="0" smtClean="0">
+                <a:solidFill>
+                  <a:schemeClr val="bg1">
+                    <a:lumMod val="50000"/>
+                  </a:schemeClr>
+                </a:solidFill>
+              </a:rPr>
+              <a:t>List&lt;Person&gt;</a:t>
+            </a:r>
+            <a:r>
+              <a:rPr lang="en-SG" sz="1000" b="1" dirty="0" smtClean="0">
+                <a:solidFill>
+                  <a:schemeClr val="bg1">
+                    <a:lumMod val="50000"/>
+                  </a:schemeClr>
+                </a:solidFill>
+              </a:rPr>
+              <a:t> Children</a:t>
+            </a:r>
+            <a:endParaRPr lang="en-SG" sz="1000" dirty="0">
+              <a:solidFill>
+                <a:schemeClr val="bg1">
+                  <a:lumMod val="50000"/>
+                </a:schemeClr>
+              </a:solidFill>
+            </a:endParaRPr>
+          </a:p>
+        </p:txBody>
+      </p:sp>
+      <p:sp>
+        <p:nvSpPr>
+          <p:cNvPr id="39" name="Rectangle 38"/>
+          <p:cNvSpPr/>
+          <p:nvPr/>
+        </p:nvSpPr>
+        <p:spPr>
+          <a:xfrm>
+            <a:off x="2627784" y="1779662"/>
+            <a:ext cx="1512168" cy="734546"/>
+          </a:xfrm>
+          <a:prstGeom prst="rect">
+            <a:avLst/>
+          </a:prstGeom>
+        </p:spPr>
+        <p:style>
+          <a:lnRef idx="1">
+            <a:schemeClr val="accent3"/>
+          </a:lnRef>
+          <a:fillRef idx="2">
+            <a:schemeClr val="accent3"/>
+          </a:fillRef>
+          <a:effectRef idx="1">
+            <a:schemeClr val="accent3"/>
+          </a:effectRef>
+          <a:fontRef idx="minor">
+            <a:schemeClr val="dk1"/>
+          </a:fontRef>
+        </p:style>
+        <p:txBody>
+          <a:bodyPr rtlCol="0" anchor="t"/>
+          <a:lstStyle/>
+          <a:p>
+            <a:r>
+              <a:rPr lang="en-SG" sz="1000" b="1" dirty="0" smtClean="0"/>
+              <a:t>Node</a:t>
+            </a:r>
+            <a:endParaRPr lang="en-SG" sz="1000" b="1" dirty="0" smtClean="0"/>
+          </a:p>
+          <a:p>
+            <a:r>
+              <a:rPr lang="en-SG" sz="1000" dirty="0" smtClean="0">
+                <a:solidFill>
+                  <a:schemeClr val="tx1"/>
+                </a:solidFill>
+              </a:rPr>
+              <a:t>Node </a:t>
+            </a:r>
+            <a:r>
+              <a:rPr lang="en-SG" sz="1000" b="1" dirty="0" smtClean="0">
+                <a:solidFill>
+                  <a:schemeClr val="tx1"/>
+                </a:solidFill>
+              </a:rPr>
+              <a:t>Parent</a:t>
+            </a:r>
+            <a:endParaRPr lang="en-SG" sz="1000" dirty="0" smtClean="0">
+              <a:solidFill>
+                <a:schemeClr val="tx1"/>
+              </a:solidFill>
+            </a:endParaRPr>
+          </a:p>
+        </p:txBody>
+      </p:sp>
+      <p:sp>
+        <p:nvSpPr>
+          <p:cNvPr id="40" name="TextBox 39"/>
+          <p:cNvSpPr txBox="1"/>
+          <p:nvPr/>
+        </p:nvSpPr>
+        <p:spPr>
+          <a:xfrm>
+            <a:off x="2699792" y="2154168"/>
+            <a:ext cx="1368151" cy="246221"/>
+          </a:xfrm>
+          <a:prstGeom prst="rect">
+            <a:avLst/>
+          </a:prstGeom>
+          <a:gradFill flip="none" rotWithShape="1">
+            <a:gsLst>
+              <a:gs pos="0">
+                <a:schemeClr val="accent1">
+                  <a:tint val="66000"/>
+                  <a:satMod val="160000"/>
+                </a:schemeClr>
+              </a:gs>
+              <a:gs pos="50000">
+                <a:schemeClr val="accent1">
+                  <a:tint val="44500"/>
+                  <a:satMod val="160000"/>
+                </a:schemeClr>
+              </a:gs>
+              <a:gs pos="100000">
+                <a:schemeClr val="accent1">
+                  <a:tint val="23500"/>
+                  <a:satMod val="160000"/>
+                </a:schemeClr>
+              </a:gs>
+            </a:gsLst>
+            <a:lin ang="16200000" scaled="1"/>
+            <a:tileRect/>
+          </a:gradFill>
+          <a:ln>
+            <a:solidFill>
+              <a:schemeClr val="accent1"/>
+            </a:solidFill>
+          </a:ln>
+        </p:spPr>
+        <p:txBody>
+          <a:bodyPr wrap="square" rtlCol="0">
+            <a:spAutoFit/>
+          </a:bodyPr>
+          <a:lstStyle/>
+          <a:p>
+            <a:r>
+              <a:rPr lang="en-SG" sz="1000" dirty="0" smtClean="0"/>
+              <a:t>List&lt;Person&gt;</a:t>
+            </a:r>
+            <a:r>
+              <a:rPr lang="en-SG" sz="1000" b="1" dirty="0" smtClean="0"/>
+              <a:t> Children</a:t>
+            </a:r>
+            <a:endParaRPr lang="en-SG" sz="1000" dirty="0"/>
+          </a:p>
+        </p:txBody>
+      </p:sp>
+      <p:sp>
+        <p:nvSpPr>
+          <p:cNvPr id="42" name="Rectangle 41"/>
+          <p:cNvSpPr/>
+          <p:nvPr/>
+        </p:nvSpPr>
+        <p:spPr>
+          <a:xfrm>
+            <a:off x="6804248" y="1491630"/>
+            <a:ext cx="1512168" cy="734546"/>
+          </a:xfrm>
+          <a:prstGeom prst="rect">
+            <a:avLst/>
+          </a:prstGeom>
+        </p:spPr>
+        <p:style>
+          <a:lnRef idx="1">
+            <a:schemeClr val="accent3"/>
+          </a:lnRef>
+          <a:fillRef idx="2">
+            <a:schemeClr val="accent3"/>
+          </a:fillRef>
+          <a:effectRef idx="1">
+            <a:schemeClr val="accent3"/>
+          </a:effectRef>
+          <a:fontRef idx="minor">
+            <a:schemeClr val="dk1"/>
+          </a:fontRef>
+        </p:style>
+        <p:txBody>
+          <a:bodyPr rtlCol="0" anchor="t"/>
+          <a:lstStyle/>
+          <a:p>
+            <a:r>
+              <a:rPr lang="en-SG" sz="1000" b="1" dirty="0" smtClean="0"/>
+              <a:t>Node</a:t>
+            </a:r>
+            <a:endParaRPr lang="en-SG" sz="1000" b="1" dirty="0" smtClean="0"/>
+          </a:p>
+          <a:p>
+            <a:r>
+              <a:rPr lang="en-SG" sz="1000" dirty="0" smtClean="0">
+                <a:solidFill>
+                  <a:schemeClr val="tx1"/>
+                </a:solidFill>
+              </a:rPr>
+              <a:t>Node </a:t>
+            </a:r>
+            <a:r>
+              <a:rPr lang="en-SG" sz="1000" b="1" dirty="0" smtClean="0">
+                <a:solidFill>
+                  <a:schemeClr val="tx1"/>
+                </a:solidFill>
+              </a:rPr>
+              <a:t>Parent</a:t>
+            </a:r>
+            <a:endParaRPr lang="en-SG" sz="1000" dirty="0" smtClean="0">
+              <a:solidFill>
+                <a:schemeClr val="tx1"/>
+              </a:solidFill>
+            </a:endParaRPr>
+          </a:p>
+        </p:txBody>
+      </p:sp>
+      <p:sp>
+        <p:nvSpPr>
+          <p:cNvPr id="43" name="TextBox 42"/>
+          <p:cNvSpPr txBox="1"/>
+          <p:nvPr/>
+        </p:nvSpPr>
+        <p:spPr>
+          <a:xfrm>
+            <a:off x="6876256" y="1875641"/>
+            <a:ext cx="1368151" cy="246221"/>
+          </a:xfrm>
+          <a:prstGeom prst="rect">
+            <a:avLst/>
+          </a:prstGeom>
+          <a:gradFill flip="none" rotWithShape="1">
+            <a:gsLst>
+              <a:gs pos="0">
+                <a:schemeClr val="accent1">
+                  <a:tint val="66000"/>
+                  <a:satMod val="160000"/>
+                </a:schemeClr>
+              </a:gs>
+              <a:gs pos="50000">
+                <a:schemeClr val="accent1">
+                  <a:tint val="44500"/>
+                  <a:satMod val="160000"/>
+                </a:schemeClr>
+              </a:gs>
+              <a:gs pos="100000">
+                <a:schemeClr val="accent1">
+                  <a:tint val="23500"/>
+                  <a:satMod val="160000"/>
+                </a:schemeClr>
+              </a:gs>
+            </a:gsLst>
+            <a:lin ang="16200000" scaled="1"/>
+            <a:tileRect/>
+          </a:gradFill>
+          <a:ln>
+            <a:solidFill>
+              <a:schemeClr val="accent1"/>
+            </a:solidFill>
+          </a:ln>
+        </p:spPr>
+        <p:txBody>
+          <a:bodyPr wrap="square" rtlCol="0">
+            <a:spAutoFit/>
+          </a:bodyPr>
+          <a:lstStyle/>
+          <a:p>
+            <a:r>
+              <a:rPr lang="en-SG" sz="1000" dirty="0" smtClean="0">
+                <a:solidFill>
+                  <a:schemeClr val="bg1">
+                    <a:lumMod val="50000"/>
+                  </a:schemeClr>
+                </a:solidFill>
+              </a:rPr>
+              <a:t>List&lt;Person&gt;</a:t>
+            </a:r>
+            <a:r>
+              <a:rPr lang="en-SG" sz="1000" b="1" dirty="0" smtClean="0">
+                <a:solidFill>
+                  <a:schemeClr val="bg1">
+                    <a:lumMod val="50000"/>
+                  </a:schemeClr>
+                </a:solidFill>
+              </a:rPr>
+              <a:t> Children</a:t>
+            </a:r>
+            <a:endParaRPr lang="en-SG" sz="1000" dirty="0">
+              <a:solidFill>
+                <a:schemeClr val="bg1">
+                  <a:lumMod val="50000"/>
+                </a:schemeClr>
+              </a:solidFill>
+            </a:endParaRPr>
+          </a:p>
+        </p:txBody>
+      </p:sp>
+      <p:sp>
+        <p:nvSpPr>
+          <p:cNvPr id="44" name="Rectangle 43"/>
+          <p:cNvSpPr/>
+          <p:nvPr/>
+        </p:nvSpPr>
+        <p:spPr>
+          <a:xfrm>
+            <a:off x="6804248" y="2283718"/>
+            <a:ext cx="1512168" cy="734546"/>
+          </a:xfrm>
+          <a:prstGeom prst="rect">
+            <a:avLst/>
+          </a:prstGeom>
+        </p:spPr>
+        <p:style>
+          <a:lnRef idx="1">
+            <a:schemeClr val="accent3"/>
+          </a:lnRef>
+          <a:fillRef idx="2">
+            <a:schemeClr val="accent3"/>
+          </a:fillRef>
+          <a:effectRef idx="1">
+            <a:schemeClr val="accent3"/>
+          </a:effectRef>
+          <a:fontRef idx="minor">
+            <a:schemeClr val="dk1"/>
+          </a:fontRef>
+        </p:style>
+        <p:txBody>
+          <a:bodyPr rtlCol="0" anchor="t"/>
+          <a:lstStyle/>
+          <a:p>
+            <a:r>
+              <a:rPr lang="en-SG" sz="1000" b="1" dirty="0" smtClean="0"/>
+              <a:t>Node</a:t>
+            </a:r>
+            <a:endParaRPr lang="en-SG" sz="1000" b="1" dirty="0" smtClean="0"/>
+          </a:p>
+          <a:p>
+            <a:r>
+              <a:rPr lang="en-SG" sz="1000" dirty="0" smtClean="0">
+                <a:solidFill>
+                  <a:schemeClr val="tx1"/>
+                </a:solidFill>
+              </a:rPr>
+              <a:t>Node </a:t>
+            </a:r>
+            <a:r>
+              <a:rPr lang="en-SG" sz="1000" b="1" dirty="0" smtClean="0">
+                <a:solidFill>
+                  <a:schemeClr val="tx1"/>
+                </a:solidFill>
+              </a:rPr>
+              <a:t>Parent</a:t>
+            </a:r>
+            <a:endParaRPr lang="en-SG" sz="1000" dirty="0" smtClean="0">
+              <a:solidFill>
+                <a:schemeClr val="tx1"/>
+              </a:solidFill>
+            </a:endParaRPr>
+          </a:p>
+        </p:txBody>
+      </p:sp>
+      <p:sp>
+        <p:nvSpPr>
+          <p:cNvPr id="45" name="TextBox 44"/>
+          <p:cNvSpPr txBox="1"/>
+          <p:nvPr/>
+        </p:nvSpPr>
+        <p:spPr>
+          <a:xfrm>
+            <a:off x="6876256" y="2653263"/>
+            <a:ext cx="1368151" cy="246221"/>
+          </a:xfrm>
+          <a:prstGeom prst="rect">
+            <a:avLst/>
+          </a:prstGeom>
+          <a:gradFill flip="none" rotWithShape="1">
+            <a:gsLst>
+              <a:gs pos="0">
+                <a:schemeClr val="accent1">
+                  <a:tint val="66000"/>
+                  <a:satMod val="160000"/>
+                </a:schemeClr>
+              </a:gs>
+              <a:gs pos="50000">
+                <a:schemeClr val="accent1">
+                  <a:tint val="44500"/>
+                  <a:satMod val="160000"/>
+                </a:schemeClr>
+              </a:gs>
+              <a:gs pos="100000">
+                <a:schemeClr val="accent1">
+                  <a:tint val="23500"/>
+                  <a:satMod val="160000"/>
+                </a:schemeClr>
+              </a:gs>
+            </a:gsLst>
+            <a:lin ang="16200000" scaled="1"/>
+            <a:tileRect/>
+          </a:gradFill>
+          <a:ln>
+            <a:solidFill>
+              <a:schemeClr val="accent1"/>
+            </a:solidFill>
+          </a:ln>
+        </p:spPr>
+        <p:txBody>
+          <a:bodyPr wrap="square" rtlCol="0">
+            <a:spAutoFit/>
+          </a:bodyPr>
+          <a:lstStyle/>
+          <a:p>
+            <a:r>
+              <a:rPr lang="en-SG" sz="1000" dirty="0" smtClean="0">
+                <a:solidFill>
+                  <a:schemeClr val="bg1">
+                    <a:lumMod val="50000"/>
+                  </a:schemeClr>
+                </a:solidFill>
+              </a:rPr>
+              <a:t>List&lt;Person&gt;</a:t>
+            </a:r>
+            <a:r>
+              <a:rPr lang="en-SG" sz="1000" b="1" dirty="0" smtClean="0">
+                <a:solidFill>
+                  <a:schemeClr val="bg1">
+                    <a:lumMod val="50000"/>
+                  </a:schemeClr>
+                </a:solidFill>
+              </a:rPr>
+              <a:t> Children</a:t>
+            </a:r>
+            <a:endParaRPr lang="en-SG" sz="1000" dirty="0">
+              <a:solidFill>
+                <a:schemeClr val="bg1">
+                  <a:lumMod val="50000"/>
+                </a:schemeClr>
+              </a:solidFill>
+            </a:endParaRPr>
+          </a:p>
+        </p:txBody>
+      </p:sp>
+      <p:sp>
+        <p:nvSpPr>
+          <p:cNvPr id="46" name="Rectangle 45"/>
+          <p:cNvSpPr/>
+          <p:nvPr/>
+        </p:nvSpPr>
+        <p:spPr>
+          <a:xfrm>
+            <a:off x="6804248" y="3075806"/>
+            <a:ext cx="1512168" cy="734546"/>
+          </a:xfrm>
+          <a:prstGeom prst="rect">
+            <a:avLst/>
+          </a:prstGeom>
+        </p:spPr>
+        <p:style>
+          <a:lnRef idx="1">
+            <a:schemeClr val="accent3"/>
+          </a:lnRef>
+          <a:fillRef idx="2">
+            <a:schemeClr val="accent3"/>
+          </a:fillRef>
+          <a:effectRef idx="1">
+            <a:schemeClr val="accent3"/>
+          </a:effectRef>
+          <a:fontRef idx="minor">
+            <a:schemeClr val="dk1"/>
+          </a:fontRef>
+        </p:style>
+        <p:txBody>
+          <a:bodyPr rtlCol="0" anchor="t"/>
+          <a:lstStyle/>
+          <a:p>
+            <a:r>
+              <a:rPr lang="en-SG" sz="1000" b="1" dirty="0" smtClean="0"/>
+              <a:t>Node</a:t>
+            </a:r>
+            <a:endParaRPr lang="en-SG" sz="1000" b="1" dirty="0" smtClean="0"/>
+          </a:p>
+          <a:p>
+            <a:r>
+              <a:rPr lang="en-SG" sz="1000" dirty="0" smtClean="0">
+                <a:solidFill>
+                  <a:schemeClr val="tx1"/>
+                </a:solidFill>
+              </a:rPr>
+              <a:t>Node </a:t>
+            </a:r>
+            <a:r>
+              <a:rPr lang="en-SG" sz="1000" b="1" dirty="0" smtClean="0">
+                <a:solidFill>
+                  <a:schemeClr val="tx1"/>
+                </a:solidFill>
+              </a:rPr>
+              <a:t>Parent</a:t>
+            </a:r>
+            <a:endParaRPr lang="en-SG" sz="1000" dirty="0" smtClean="0">
+              <a:solidFill>
+                <a:schemeClr val="tx1"/>
+              </a:solidFill>
+            </a:endParaRPr>
+          </a:p>
+        </p:txBody>
+      </p:sp>
+      <p:sp>
+        <p:nvSpPr>
+          <p:cNvPr id="47" name="TextBox 46"/>
+          <p:cNvSpPr txBox="1"/>
+          <p:nvPr/>
+        </p:nvSpPr>
+        <p:spPr>
+          <a:xfrm>
+            <a:off x="6876256" y="3459817"/>
+            <a:ext cx="1368151" cy="246221"/>
+          </a:xfrm>
+          <a:prstGeom prst="rect">
+            <a:avLst/>
+          </a:prstGeom>
+          <a:gradFill flip="none" rotWithShape="1">
+            <a:gsLst>
+              <a:gs pos="0">
+                <a:schemeClr val="accent1">
+                  <a:tint val="66000"/>
+                  <a:satMod val="160000"/>
+                </a:schemeClr>
+              </a:gs>
+              <a:gs pos="50000">
+                <a:schemeClr val="accent1">
+                  <a:tint val="44500"/>
+                  <a:satMod val="160000"/>
+                </a:schemeClr>
+              </a:gs>
+              <a:gs pos="100000">
+                <a:schemeClr val="accent1">
+                  <a:tint val="23500"/>
+                  <a:satMod val="160000"/>
+                </a:schemeClr>
+              </a:gs>
+            </a:gsLst>
+            <a:lin ang="16200000" scaled="1"/>
+            <a:tileRect/>
+          </a:gradFill>
+          <a:ln>
+            <a:solidFill>
+              <a:schemeClr val="accent1"/>
+            </a:solidFill>
+          </a:ln>
+        </p:spPr>
+        <p:txBody>
+          <a:bodyPr wrap="square" rtlCol="0">
+            <a:spAutoFit/>
+          </a:bodyPr>
+          <a:lstStyle/>
+          <a:p>
+            <a:r>
+              <a:rPr lang="en-SG" sz="1000" dirty="0" smtClean="0">
+                <a:solidFill>
+                  <a:schemeClr val="bg1">
+                    <a:lumMod val="50000"/>
+                  </a:schemeClr>
+                </a:solidFill>
+              </a:rPr>
+              <a:t>List&lt;Person&gt;</a:t>
+            </a:r>
+            <a:r>
+              <a:rPr lang="en-SG" sz="1000" b="1" dirty="0" smtClean="0">
+                <a:solidFill>
+                  <a:schemeClr val="bg1">
+                    <a:lumMod val="50000"/>
+                  </a:schemeClr>
+                </a:solidFill>
+              </a:rPr>
+              <a:t> Children</a:t>
+            </a:r>
+            <a:endParaRPr lang="en-SG" sz="1000" dirty="0">
+              <a:solidFill>
+                <a:schemeClr val="bg1">
+                  <a:lumMod val="50000"/>
+                </a:schemeClr>
+              </a:solidFill>
+            </a:endParaRPr>
+          </a:p>
+        </p:txBody>
+      </p:sp>
+      <p:sp>
+        <p:nvSpPr>
+          <p:cNvPr id="48" name="Rectangle 47"/>
+          <p:cNvSpPr/>
+          <p:nvPr/>
+        </p:nvSpPr>
+        <p:spPr>
+          <a:xfrm>
+            <a:off x="6804248" y="3867894"/>
+            <a:ext cx="1512168" cy="734546"/>
+          </a:xfrm>
+          <a:prstGeom prst="rect">
+            <a:avLst/>
+          </a:prstGeom>
+        </p:spPr>
+        <p:style>
+          <a:lnRef idx="1">
+            <a:schemeClr val="accent3"/>
+          </a:lnRef>
+          <a:fillRef idx="2">
+            <a:schemeClr val="accent3"/>
+          </a:fillRef>
+          <a:effectRef idx="1">
+            <a:schemeClr val="accent3"/>
+          </a:effectRef>
+          <a:fontRef idx="minor">
+            <a:schemeClr val="dk1"/>
+          </a:fontRef>
+        </p:style>
+        <p:txBody>
+          <a:bodyPr rtlCol="0" anchor="t"/>
+          <a:lstStyle/>
+          <a:p>
+            <a:r>
+              <a:rPr lang="en-SG" sz="1000" b="1" dirty="0" smtClean="0"/>
+              <a:t>Node</a:t>
+            </a:r>
+            <a:endParaRPr lang="en-SG" sz="1000" b="1" dirty="0" smtClean="0"/>
+          </a:p>
+          <a:p>
+            <a:r>
+              <a:rPr lang="en-SG" sz="1000" dirty="0" smtClean="0">
+                <a:solidFill>
+                  <a:schemeClr val="tx1"/>
+                </a:solidFill>
+              </a:rPr>
+              <a:t>Node </a:t>
+            </a:r>
+            <a:r>
+              <a:rPr lang="en-SG" sz="1000" b="1" dirty="0" smtClean="0">
+                <a:solidFill>
+                  <a:schemeClr val="tx1"/>
+                </a:solidFill>
+              </a:rPr>
+              <a:t>Parent</a:t>
+            </a:r>
+            <a:endParaRPr lang="en-SG" sz="1000" dirty="0" smtClean="0">
+              <a:solidFill>
+                <a:schemeClr val="tx1"/>
+              </a:solidFill>
+            </a:endParaRPr>
+          </a:p>
+        </p:txBody>
+      </p:sp>
+      <p:sp>
+        <p:nvSpPr>
+          <p:cNvPr id="49" name="TextBox 48"/>
+          <p:cNvSpPr txBox="1"/>
+          <p:nvPr/>
+        </p:nvSpPr>
+        <p:spPr>
+          <a:xfrm>
+            <a:off x="6876256" y="4251905"/>
+            <a:ext cx="1368151" cy="246221"/>
+          </a:xfrm>
+          <a:prstGeom prst="rect">
+            <a:avLst/>
+          </a:prstGeom>
+          <a:gradFill flip="none" rotWithShape="1">
+            <a:gsLst>
+              <a:gs pos="0">
+                <a:schemeClr val="accent1">
+                  <a:tint val="66000"/>
+                  <a:satMod val="160000"/>
+                </a:schemeClr>
+              </a:gs>
+              <a:gs pos="50000">
+                <a:schemeClr val="accent1">
+                  <a:tint val="44500"/>
+                  <a:satMod val="160000"/>
+                </a:schemeClr>
+              </a:gs>
+              <a:gs pos="100000">
+                <a:schemeClr val="accent1">
+                  <a:tint val="23500"/>
+                  <a:satMod val="160000"/>
+                </a:schemeClr>
+              </a:gs>
+            </a:gsLst>
+            <a:lin ang="16200000" scaled="1"/>
+            <a:tileRect/>
+          </a:gradFill>
+          <a:ln>
+            <a:solidFill>
+              <a:schemeClr val="accent1"/>
+            </a:solidFill>
+          </a:ln>
+        </p:spPr>
+        <p:txBody>
+          <a:bodyPr wrap="square" rtlCol="0">
+            <a:spAutoFit/>
+          </a:bodyPr>
+          <a:lstStyle/>
+          <a:p>
+            <a:r>
+              <a:rPr lang="en-SG" sz="1000" dirty="0" smtClean="0">
+                <a:solidFill>
+                  <a:schemeClr val="bg1">
+                    <a:lumMod val="50000"/>
+                  </a:schemeClr>
+                </a:solidFill>
+              </a:rPr>
+              <a:t>List&lt;Person&gt;</a:t>
+            </a:r>
+            <a:r>
+              <a:rPr lang="en-SG" sz="1000" b="1" dirty="0" smtClean="0">
+                <a:solidFill>
+                  <a:schemeClr val="bg1">
+                    <a:lumMod val="50000"/>
+                  </a:schemeClr>
+                </a:solidFill>
+              </a:rPr>
+              <a:t> Children</a:t>
+            </a:r>
+            <a:endParaRPr lang="en-SG" sz="1000" dirty="0">
+              <a:solidFill>
+                <a:schemeClr val="bg1">
+                  <a:lumMod val="50000"/>
+                </a:schemeClr>
+              </a:solidFill>
+            </a:endParaRPr>
+          </a:p>
+        </p:txBody>
+      </p:sp>
+      <p:cxnSp>
+        <p:nvCxnSpPr>
+          <p:cNvPr id="11" name="Straight Arrow Connector 10"/>
+          <p:cNvCxnSpPr>
+            <a:stCxn id="37" idx="1"/>
+          </p:cNvCxnSpPr>
+          <p:nvPr/>
+        </p:nvCxnSpPr>
+        <p:spPr>
+          <a:xfrm flipH="1">
+            <a:off x="6012159" y="1052349"/>
+            <a:ext cx="792089" cy="130343"/>
+          </a:xfrm>
+          <a:prstGeom prst="straightConnector1">
+            <a:avLst/>
+          </a:prstGeom>
+          <a:ln>
+            <a:tailEnd type="arrow"/>
+          </a:ln>
+        </p:spPr>
+        <p:style>
+          <a:lnRef idx="1">
+            <a:schemeClr val="accent1"/>
+          </a:lnRef>
+          <a:fillRef idx="0">
+            <a:schemeClr val="accent1"/>
+          </a:fillRef>
+          <a:effectRef idx="0">
+            <a:schemeClr val="accent1"/>
+          </a:effectRef>
+          <a:fontRef idx="minor">
+            <a:schemeClr val="tx1"/>
+          </a:fontRef>
+        </p:style>
+      </p:cxnSp>
+      <p:cxnSp>
+        <p:nvCxnSpPr>
+          <p:cNvPr id="15" name="Straight Arrow Connector 14"/>
+          <p:cNvCxnSpPr>
+            <a:stCxn id="42" idx="1"/>
+            <a:endCxn id="36" idx="3"/>
+          </p:cNvCxnSpPr>
+          <p:nvPr/>
+        </p:nvCxnSpPr>
+        <p:spPr>
+          <a:xfrm flipH="1" flipV="1">
+            <a:off x="6012159" y="1182693"/>
+            <a:ext cx="792089" cy="676210"/>
+          </a:xfrm>
+          <a:prstGeom prst="straightConnector1">
+            <a:avLst/>
+          </a:prstGeom>
+          <a:ln>
+            <a:tailEnd type="arrow"/>
+          </a:ln>
+        </p:spPr>
+        <p:style>
+          <a:lnRef idx="1">
+            <a:schemeClr val="accent1"/>
+          </a:lnRef>
+          <a:fillRef idx="0">
+            <a:schemeClr val="accent1"/>
+          </a:fillRef>
+          <a:effectRef idx="0">
+            <a:schemeClr val="accent1"/>
+          </a:effectRef>
+          <a:fontRef idx="minor">
+            <a:schemeClr val="tx1"/>
+          </a:fontRef>
+        </p:style>
+      </p:cxnSp>
+      <p:cxnSp>
+        <p:nvCxnSpPr>
+          <p:cNvPr id="18" name="Straight Arrow Connector 17"/>
+          <p:cNvCxnSpPr>
+            <a:stCxn id="35" idx="1"/>
+            <a:endCxn id="34" idx="3"/>
+          </p:cNvCxnSpPr>
+          <p:nvPr/>
+        </p:nvCxnSpPr>
+        <p:spPr>
+          <a:xfrm flipH="1">
+            <a:off x="4067943" y="1052349"/>
+            <a:ext cx="504057" cy="288826"/>
+          </a:xfrm>
+          <a:prstGeom prst="straightConnector1">
+            <a:avLst/>
+          </a:prstGeom>
+          <a:ln>
+            <a:tailEnd type="arrow"/>
+          </a:ln>
+        </p:spPr>
+        <p:style>
+          <a:lnRef idx="1">
+            <a:schemeClr val="accent1"/>
+          </a:lnRef>
+          <a:fillRef idx="0">
+            <a:schemeClr val="accent1"/>
+          </a:fillRef>
+          <a:effectRef idx="0">
+            <a:schemeClr val="accent1"/>
+          </a:effectRef>
+          <a:fontRef idx="minor">
+            <a:schemeClr val="tx1"/>
+          </a:fontRef>
+        </p:style>
+      </p:cxnSp>
+      <p:cxnSp>
+        <p:nvCxnSpPr>
+          <p:cNvPr id="50" name="Straight Arrow Connector 49"/>
+          <p:cNvCxnSpPr>
+            <a:stCxn id="44" idx="1"/>
+            <a:endCxn id="34" idx="3"/>
+          </p:cNvCxnSpPr>
+          <p:nvPr/>
+        </p:nvCxnSpPr>
+        <p:spPr>
+          <a:xfrm flipH="1" flipV="1">
+            <a:off x="4067943" y="1341175"/>
+            <a:ext cx="2736305" cy="1309816"/>
+          </a:xfrm>
+          <a:prstGeom prst="straightConnector1">
+            <a:avLst/>
+          </a:prstGeom>
+          <a:ln>
+            <a:tailEnd type="arrow"/>
+          </a:ln>
+        </p:spPr>
+        <p:style>
+          <a:lnRef idx="1">
+            <a:schemeClr val="accent1"/>
+          </a:lnRef>
+          <a:fillRef idx="0">
+            <a:schemeClr val="accent1"/>
+          </a:fillRef>
+          <a:effectRef idx="0">
+            <a:schemeClr val="accent1"/>
+          </a:effectRef>
+          <a:fontRef idx="minor">
+            <a:schemeClr val="tx1"/>
+          </a:fontRef>
+        </p:style>
+      </p:cxnSp>
+      <p:cxnSp>
+        <p:nvCxnSpPr>
+          <p:cNvPr id="52" name="Straight Arrow Connector 51"/>
+          <p:cNvCxnSpPr>
+            <a:endCxn id="40" idx="3"/>
+          </p:cNvCxnSpPr>
+          <p:nvPr/>
+        </p:nvCxnSpPr>
+        <p:spPr>
+          <a:xfrm flipH="1" flipV="1">
+            <a:off x="4067943" y="2277279"/>
+            <a:ext cx="2736305" cy="1165800"/>
+          </a:xfrm>
+          <a:prstGeom prst="straightConnector1">
+            <a:avLst/>
+          </a:prstGeom>
+          <a:ln>
+            <a:tailEnd type="arrow"/>
+          </a:ln>
+        </p:spPr>
+        <p:style>
+          <a:lnRef idx="1">
+            <a:schemeClr val="accent1"/>
+          </a:lnRef>
+          <a:fillRef idx="0">
+            <a:schemeClr val="accent1"/>
+          </a:fillRef>
+          <a:effectRef idx="0">
+            <a:schemeClr val="accent1"/>
+          </a:effectRef>
+          <a:fontRef idx="minor">
+            <a:schemeClr val="tx1"/>
+          </a:fontRef>
+        </p:style>
+      </p:cxnSp>
+      <p:cxnSp>
+        <p:nvCxnSpPr>
+          <p:cNvPr id="54" name="Straight Arrow Connector 53"/>
+          <p:cNvCxnSpPr>
+            <a:endCxn id="28" idx="3"/>
+          </p:cNvCxnSpPr>
+          <p:nvPr/>
+        </p:nvCxnSpPr>
+        <p:spPr>
+          <a:xfrm flipH="1" flipV="1">
+            <a:off x="1835695" y="3702973"/>
+            <a:ext cx="4968553" cy="532194"/>
+          </a:xfrm>
+          <a:prstGeom prst="straightConnector1">
+            <a:avLst/>
+          </a:prstGeom>
+          <a:ln>
+            <a:tailEnd type="arrow"/>
+          </a:ln>
+        </p:spPr>
+        <p:style>
+          <a:lnRef idx="1">
+            <a:schemeClr val="accent1"/>
+          </a:lnRef>
+          <a:fillRef idx="0">
+            <a:schemeClr val="accent1"/>
+          </a:fillRef>
+          <a:effectRef idx="0">
+            <a:schemeClr val="accent1"/>
+          </a:effectRef>
+          <a:fontRef idx="minor">
+            <a:schemeClr val="tx1"/>
+          </a:fontRef>
+        </p:style>
+      </p:cxnSp>
+      <p:cxnSp>
+        <p:nvCxnSpPr>
+          <p:cNvPr id="56" name="Straight Arrow Connector 55"/>
+          <p:cNvCxnSpPr>
+            <a:endCxn id="5" idx="3"/>
+          </p:cNvCxnSpPr>
+          <p:nvPr/>
+        </p:nvCxnSpPr>
+        <p:spPr>
+          <a:xfrm flipH="1">
+            <a:off x="1835695" y="1210831"/>
+            <a:ext cx="792089" cy="331902"/>
+          </a:xfrm>
+          <a:prstGeom prst="straightConnector1">
+            <a:avLst/>
+          </a:prstGeom>
+          <a:ln>
+            <a:tailEnd type="arrow"/>
+          </a:ln>
+        </p:spPr>
+        <p:style>
+          <a:lnRef idx="1">
+            <a:schemeClr val="accent1"/>
+          </a:lnRef>
+          <a:fillRef idx="0">
+            <a:schemeClr val="accent1"/>
+          </a:fillRef>
+          <a:effectRef idx="0">
+            <a:schemeClr val="accent1"/>
+          </a:effectRef>
+          <a:fontRef idx="minor">
+            <a:schemeClr val="tx1"/>
+          </a:fontRef>
+        </p:style>
+      </p:cxnSp>
+      <p:cxnSp>
+        <p:nvCxnSpPr>
+          <p:cNvPr id="58" name="Straight Arrow Connector 57"/>
+          <p:cNvCxnSpPr>
+            <a:endCxn id="5" idx="3"/>
+          </p:cNvCxnSpPr>
+          <p:nvPr/>
+        </p:nvCxnSpPr>
+        <p:spPr>
+          <a:xfrm flipH="1" flipV="1">
+            <a:off x="1835695" y="1542733"/>
+            <a:ext cx="792089" cy="611435"/>
+          </a:xfrm>
+          <a:prstGeom prst="straightConnector1">
+            <a:avLst/>
+          </a:prstGeom>
+          <a:ln>
+            <a:tailEnd type="arrow"/>
+          </a:ln>
+        </p:spPr>
+        <p:style>
+          <a:lnRef idx="1">
+            <a:schemeClr val="accent1"/>
+          </a:lnRef>
+          <a:fillRef idx="0">
+            <a:schemeClr val="accent1"/>
+          </a:fillRef>
+          <a:effectRef idx="0">
+            <a:schemeClr val="accent1"/>
+          </a:effectRef>
+          <a:fontRef idx="minor">
+            <a:schemeClr val="tx1"/>
+          </a:fontRef>
+        </p:style>
+      </p:cxnSp>
+    </p:spTree>
+    <p:extLst>
+      <p:ext uri="{BB962C8B-B14F-4D97-AF65-F5344CB8AC3E}">
+        <p14:creationId xmlns:p14="http://schemas.microsoft.com/office/powerpoint/2010/main" val="378890275"/>
+      </p:ext>
+    </p:extLst>
+  </p:cSld>
+  <p:clrMapOvr>
+    <a:masterClrMapping/>
+  </p:clrMapOvr>
+</p:sld>
+</file>
+
+<file path=ppt/slides/slide7.xml><?xml version="1.0" encoding="utf-8"?>
+<p:sld xmlns:a="http://schemas.openxmlformats.org/drawingml/2006/main" xmlns:r="http://schemas.openxmlformats.org/officeDocument/2006/relationships" xmlns:p="http://schemas.openxmlformats.org/presentationml/2006/main">
+  <p:cSld>
+    <p:spTree>
+      <p:nvGrpSpPr>
+        <p:cNvPr id="1" name=""/>
+        <p:cNvGrpSpPr/>
+        <p:nvPr/>
+      </p:nvGrpSpPr>
+      <p:grpSpPr>
+        <a:xfrm>
+          <a:off x="0" y="0"/>
+          <a:ext cx="0" cy="0"/>
+          <a:chOff x="0" y="0"/>
+          <a:chExt cx="0" cy="0"/>
+        </a:xfrm>
+      </p:grpSpPr>
+      <p:sp>
+        <p:nvSpPr>
+          <p:cNvPr id="21" name="Rectangle 20"/>
+          <p:cNvSpPr/>
+          <p:nvPr/>
+        </p:nvSpPr>
+        <p:spPr>
+          <a:xfrm>
+            <a:off x="5004048" y="318016"/>
+            <a:ext cx="1944216" cy="3693894"/>
+          </a:xfrm>
+          <a:prstGeom prst="rect">
+            <a:avLst/>
+          </a:prstGeom>
+        </p:spPr>
+        <p:style>
+          <a:lnRef idx="1">
+            <a:schemeClr val="dk1"/>
+          </a:lnRef>
+          <a:fillRef idx="2">
+            <a:schemeClr val="dk1"/>
+          </a:fillRef>
+          <a:effectRef idx="1">
+            <a:schemeClr val="dk1"/>
+          </a:effectRef>
+          <a:fontRef idx="minor">
+            <a:schemeClr val="dk1"/>
+          </a:fontRef>
+        </p:style>
+        <p:txBody>
+          <a:bodyPr rtlCol="0" anchor="t"/>
+          <a:lstStyle/>
+          <a:p>
+            <a:pPr algn="ctr"/>
+            <a:r>
+              <a:rPr lang="en-SG" dirty="0" smtClean="0"/>
+              <a:t>Children</a:t>
+            </a:r>
+            <a:endParaRPr lang="en-SG" dirty="0"/>
+          </a:p>
+        </p:txBody>
+      </p:sp>
+      <p:sp>
+        <p:nvSpPr>
+          <p:cNvPr id="2" name="Rectangle 1"/>
+          <p:cNvSpPr/>
+          <p:nvPr/>
+        </p:nvSpPr>
+        <p:spPr>
+          <a:xfrm>
+            <a:off x="2771800" y="318016"/>
+            <a:ext cx="1944216" cy="3693894"/>
+          </a:xfrm>
+          <a:prstGeom prst="rect">
+            <a:avLst/>
+          </a:prstGeom>
+        </p:spPr>
+        <p:style>
+          <a:lnRef idx="1">
+            <a:schemeClr val="dk1"/>
+          </a:lnRef>
+          <a:fillRef idx="2">
+            <a:schemeClr val="dk1"/>
+          </a:fillRef>
+          <a:effectRef idx="1">
+            <a:schemeClr val="dk1"/>
+          </a:effectRef>
+          <a:fontRef idx="minor">
+            <a:schemeClr val="dk1"/>
+          </a:fontRef>
+        </p:style>
+        <p:txBody>
+          <a:bodyPr rtlCol="0" anchor="t"/>
+          <a:lstStyle/>
+          <a:p>
+            <a:pPr algn="ctr"/>
+            <a:r>
+              <a:rPr lang="en-SG" dirty="0" smtClean="0"/>
+              <a:t>Parents</a:t>
+            </a:r>
+            <a:endParaRPr lang="en-SG" dirty="0"/>
+          </a:p>
+        </p:txBody>
+      </p:sp>
+      <p:sp>
+        <p:nvSpPr>
+          <p:cNvPr id="4" name="Rectangle 3"/>
+          <p:cNvSpPr/>
+          <p:nvPr/>
+        </p:nvSpPr>
+        <p:spPr>
+          <a:xfrm>
+            <a:off x="2987824" y="1045116"/>
+            <a:ext cx="1512168" cy="950570"/>
+          </a:xfrm>
+          <a:prstGeom prst="rect">
+            <a:avLst/>
+          </a:prstGeom>
+        </p:spPr>
+        <p:style>
+          <a:lnRef idx="1">
+            <a:schemeClr val="accent3"/>
+          </a:lnRef>
+          <a:fillRef idx="2">
+            <a:schemeClr val="accent3"/>
+          </a:fillRef>
+          <a:effectRef idx="1">
+            <a:schemeClr val="accent3"/>
+          </a:effectRef>
+          <a:fontRef idx="minor">
+            <a:schemeClr val="dk1"/>
+          </a:fontRef>
+        </p:style>
+        <p:txBody>
+          <a:bodyPr rtlCol="0" anchor="t"/>
+          <a:lstStyle/>
+          <a:p>
+            <a:r>
+              <a:rPr lang="en-SG" sz="1000" b="1" dirty="0" smtClean="0"/>
               <a:t>Person </a:t>
             </a:r>
+          </a:p>
+          <a:p>
+            <a:r>
+              <a:rPr lang="en-SG" sz="1000" dirty="0" smtClean="0">
+                <a:solidFill>
+                  <a:schemeClr val="bg1">
+                    <a:lumMod val="50000"/>
+                  </a:schemeClr>
+                </a:solidFill>
+              </a:rPr>
+              <a:t>Person </a:t>
+            </a:r>
+            <a:r>
+              <a:rPr lang="en-SG" sz="1000" b="1" dirty="0" smtClean="0">
+                <a:solidFill>
+                  <a:schemeClr val="bg1">
+                    <a:lumMod val="50000"/>
+                  </a:schemeClr>
+                </a:solidFill>
+              </a:rPr>
+              <a:t>Parent1</a:t>
+            </a:r>
+            <a:endParaRPr lang="en-SG" sz="1000" dirty="0" smtClean="0">
+              <a:solidFill>
+                <a:schemeClr val="bg1">
+                  <a:lumMod val="50000"/>
+                </a:schemeClr>
+              </a:solidFill>
+            </a:endParaRPr>
+          </a:p>
+          <a:p>
+            <a:r>
+              <a:rPr lang="en-SG" sz="1000" dirty="0" smtClean="0">
+                <a:solidFill>
+                  <a:schemeClr val="bg1">
+                    <a:lumMod val="50000"/>
+                  </a:schemeClr>
+                </a:solidFill>
+              </a:rPr>
+              <a:t>Person </a:t>
+            </a:r>
+            <a:r>
+              <a:rPr lang="en-SG" sz="1000" b="1" dirty="0" smtClean="0">
+                <a:solidFill>
+                  <a:schemeClr val="bg1">
+                    <a:lumMod val="50000"/>
+                  </a:schemeClr>
+                </a:solidFill>
+              </a:rPr>
+              <a:t>Parent2</a:t>
+            </a:r>
+            <a:endParaRPr lang="en-SG" sz="1000" b="1" dirty="0" smtClean="0">
+              <a:solidFill>
+                <a:schemeClr val="bg1">
+                  <a:lumMod val="50000"/>
+                </a:schemeClr>
+              </a:solidFill>
+            </a:endParaRPr>
           </a:p>
           <a:p>
             <a:r>
@@ -17635,14 +19610,170 @@
               <a:t>Person </a:t>
             </a:r>
             <a:r>
-              <a:rPr lang="en-SG" sz="1000" b="1" dirty="0"/>
-              <a:t>Father</a:t>
-            </a:r>
-            <a:r>
-              <a:rPr lang="en-SG" sz="1000" dirty="0"/>
-              <a:t> </a:t>
-            </a:r>
-            <a:endParaRPr lang="en-SG" sz="1000" dirty="0" smtClean="0"/>
+              <a:rPr lang="en-SG" sz="1000" b="1" dirty="0" smtClean="0"/>
+              <a:t>Partner</a:t>
+            </a:r>
+            <a:endParaRPr lang="en-SG" sz="1000" b="1" dirty="0"/>
+          </a:p>
+        </p:txBody>
+      </p:sp>
+      <p:sp>
+        <p:nvSpPr>
+          <p:cNvPr id="5" name="TextBox 4"/>
+          <p:cNvSpPr txBox="1"/>
+          <p:nvPr/>
+        </p:nvSpPr>
+        <p:spPr>
+          <a:xfrm>
+            <a:off x="3059832" y="1707654"/>
+            <a:ext cx="1368151" cy="246221"/>
+          </a:xfrm>
+          <a:prstGeom prst="rect">
+            <a:avLst/>
+          </a:prstGeom>
+          <a:gradFill flip="none" rotWithShape="1">
+            <a:gsLst>
+              <a:gs pos="0">
+                <a:schemeClr val="accent1">
+                  <a:tint val="66000"/>
+                  <a:satMod val="160000"/>
+                </a:schemeClr>
+              </a:gs>
+              <a:gs pos="50000">
+                <a:schemeClr val="accent1">
+                  <a:tint val="44500"/>
+                  <a:satMod val="160000"/>
+                </a:schemeClr>
+              </a:gs>
+              <a:gs pos="100000">
+                <a:schemeClr val="accent1">
+                  <a:tint val="23500"/>
+                  <a:satMod val="160000"/>
+                </a:schemeClr>
+              </a:gs>
+            </a:gsLst>
+            <a:lin ang="16200000" scaled="1"/>
+            <a:tileRect/>
+          </a:gradFill>
+          <a:ln>
+            <a:solidFill>
+              <a:schemeClr val="accent1"/>
+            </a:solidFill>
+          </a:ln>
+        </p:spPr>
+        <p:txBody>
+          <a:bodyPr wrap="square" rtlCol="0">
+            <a:spAutoFit/>
+          </a:bodyPr>
+          <a:lstStyle/>
+          <a:p>
+            <a:r>
+              <a:rPr lang="en-SG" sz="1000" dirty="0" smtClean="0"/>
+              <a:t>List&lt;Person&gt;</a:t>
+            </a:r>
+            <a:r>
+              <a:rPr lang="en-SG" sz="1000" b="1" dirty="0" smtClean="0"/>
+              <a:t> Children</a:t>
+            </a:r>
+            <a:endParaRPr lang="en-SG" sz="1000" dirty="0"/>
+          </a:p>
+        </p:txBody>
+      </p:sp>
+      <p:sp>
+        <p:nvSpPr>
+          <p:cNvPr id="6" name="Rectangle 5"/>
+          <p:cNvSpPr/>
+          <p:nvPr/>
+        </p:nvSpPr>
+        <p:spPr>
+          <a:xfrm>
+            <a:off x="2987824" y="2341260"/>
+            <a:ext cx="1512168" cy="950570"/>
+          </a:xfrm>
+          <a:prstGeom prst="rect">
+            <a:avLst/>
+          </a:prstGeom>
+        </p:spPr>
+        <p:style>
+          <a:lnRef idx="1">
+            <a:schemeClr val="accent3"/>
+          </a:lnRef>
+          <a:fillRef idx="2">
+            <a:schemeClr val="accent3"/>
+          </a:fillRef>
+          <a:effectRef idx="1">
+            <a:schemeClr val="accent3"/>
+          </a:effectRef>
+          <a:fontRef idx="minor">
+            <a:schemeClr val="dk1"/>
+          </a:fontRef>
+        </p:style>
+        <p:txBody>
+          <a:bodyPr rtlCol="0" anchor="t"/>
+          <a:lstStyle/>
+          <a:p>
+            <a:r>
+              <a:rPr lang="en-SG" sz="1000" b="1" dirty="0" smtClean="0"/>
+              <a:t>Person </a:t>
+            </a:r>
+          </a:p>
+          <a:p>
+            <a:r>
+              <a:rPr lang="en-SG" sz="1000" dirty="0" smtClean="0">
+                <a:solidFill>
+                  <a:schemeClr val="bg1">
+                    <a:lumMod val="50000"/>
+                  </a:schemeClr>
+                </a:solidFill>
+              </a:rPr>
+              <a:t>Person </a:t>
+            </a:r>
+            <a:r>
+              <a:rPr lang="en-SG" sz="1000" b="1" dirty="0">
+                <a:solidFill>
+                  <a:schemeClr val="bg1">
+                    <a:lumMod val="50000"/>
+                  </a:schemeClr>
+                </a:solidFill>
+              </a:rPr>
+              <a:t>Parent1</a:t>
+            </a:r>
+            <a:endParaRPr lang="en-SG" sz="1000" dirty="0" smtClean="0">
+              <a:solidFill>
+                <a:schemeClr val="bg1">
+                  <a:lumMod val="50000"/>
+                </a:schemeClr>
+              </a:solidFill>
+            </a:endParaRPr>
+          </a:p>
+          <a:p>
+            <a:r>
+              <a:rPr lang="en-SG" sz="1000" dirty="0" smtClean="0">
+                <a:solidFill>
+                  <a:schemeClr val="bg1">
+                    <a:lumMod val="50000"/>
+                  </a:schemeClr>
+                </a:solidFill>
+              </a:rPr>
+              <a:t>Person </a:t>
+            </a:r>
+            <a:r>
+              <a:rPr lang="en-SG" sz="1000" b="1" dirty="0">
+                <a:solidFill>
+                  <a:schemeClr val="bg1">
+                    <a:lumMod val="50000"/>
+                  </a:schemeClr>
+                </a:solidFill>
+              </a:rPr>
+              <a:t>Parent2</a:t>
+            </a:r>
+            <a:endParaRPr lang="en-SG" sz="1000" b="1" dirty="0" smtClean="0">
+              <a:solidFill>
+                <a:schemeClr val="bg1">
+                  <a:lumMod val="50000"/>
+                </a:schemeClr>
+              </a:solidFill>
+            </a:endParaRPr>
           </a:p>
           <a:p>
             <a:r>
@@ -17651,7 +19782,110 @@
             </a:r>
             <a:r>
               <a:rPr lang="en-SG" sz="1000" b="1" dirty="0" smtClean="0"/>
-              <a:t>Mother </a:t>
+              <a:t>Partner</a:t>
+            </a:r>
+            <a:endParaRPr lang="en-SG" sz="1000" b="1" dirty="0"/>
+          </a:p>
+        </p:txBody>
+      </p:sp>
+      <p:sp>
+        <p:nvSpPr>
+          <p:cNvPr id="7" name="TextBox 6"/>
+          <p:cNvSpPr txBox="1"/>
+          <p:nvPr/>
+        </p:nvSpPr>
+        <p:spPr>
+          <a:xfrm>
+            <a:off x="3059832" y="3003798"/>
+            <a:ext cx="1368151" cy="246221"/>
+          </a:xfrm>
+          <a:prstGeom prst="rect">
+            <a:avLst/>
+          </a:prstGeom>
+          <a:gradFill flip="none" rotWithShape="1">
+            <a:gsLst>
+              <a:gs pos="0">
+                <a:schemeClr val="accent1">
+                  <a:tint val="66000"/>
+                  <a:satMod val="160000"/>
+                </a:schemeClr>
+              </a:gs>
+              <a:gs pos="50000">
+                <a:schemeClr val="accent1">
+                  <a:tint val="44500"/>
+                  <a:satMod val="160000"/>
+                </a:schemeClr>
+              </a:gs>
+              <a:gs pos="100000">
+                <a:schemeClr val="accent1">
+                  <a:tint val="23500"/>
+                  <a:satMod val="160000"/>
+                </a:schemeClr>
+              </a:gs>
+            </a:gsLst>
+            <a:lin ang="16200000" scaled="1"/>
+            <a:tileRect/>
+          </a:gradFill>
+          <a:ln>
+            <a:solidFill>
+              <a:schemeClr val="accent1"/>
+            </a:solidFill>
+          </a:ln>
+        </p:spPr>
+        <p:txBody>
+          <a:bodyPr wrap="square" rtlCol="0">
+            <a:spAutoFit/>
+          </a:bodyPr>
+          <a:lstStyle/>
+          <a:p>
+            <a:r>
+              <a:rPr lang="en-SG" sz="1000" dirty="0" smtClean="0"/>
+              <a:t>List&lt;Person&gt;</a:t>
+            </a:r>
+            <a:r>
+              <a:rPr lang="en-SG" sz="1000" b="1" dirty="0" smtClean="0"/>
+              <a:t> Children</a:t>
+            </a:r>
+            <a:endParaRPr lang="en-SG" sz="1000" dirty="0"/>
+          </a:p>
+        </p:txBody>
+      </p:sp>
+      <p:sp>
+        <p:nvSpPr>
+          <p:cNvPr id="8" name="Rectangle 7"/>
+          <p:cNvSpPr/>
+          <p:nvPr/>
+        </p:nvSpPr>
+        <p:spPr>
+          <a:xfrm>
+            <a:off x="5148064" y="627534"/>
+            <a:ext cx="1512168" cy="950570"/>
+          </a:xfrm>
+          <a:prstGeom prst="rect">
+            <a:avLst/>
+          </a:prstGeom>
+        </p:spPr>
+        <p:style>
+          <a:lnRef idx="1">
+            <a:schemeClr val="accent3"/>
+          </a:lnRef>
+          <a:fillRef idx="2">
+            <a:schemeClr val="accent3"/>
+          </a:fillRef>
+          <a:effectRef idx="1">
+            <a:schemeClr val="accent3"/>
+          </a:effectRef>
+          <a:fontRef idx="minor">
+            <a:schemeClr val="dk1"/>
+          </a:fontRef>
+        </p:style>
+        <p:txBody>
+          <a:bodyPr rtlCol="0" anchor="t"/>
+          <a:lstStyle/>
+          <a:p>
+            <a:r>
+              <a:rPr lang="en-SG" sz="1000" b="1" dirty="0" smtClean="0"/>
+              <a:t>Person </a:t>
             </a:r>
           </a:p>
           <a:p>
@@ -17660,10 +19894,250 @@
               <a:t>Person </a:t>
             </a:r>
             <a:r>
+              <a:rPr lang="en-SG" sz="1000" b="1" dirty="0"/>
+              <a:t>Parent1</a:t>
+            </a:r>
+            <a:endParaRPr lang="en-SG" sz="1000" dirty="0" smtClean="0"/>
+          </a:p>
+          <a:p>
+            <a:r>
+              <a:rPr lang="en-SG" sz="1000" dirty="0" smtClean="0"/>
+              <a:t>Person </a:t>
+            </a:r>
+            <a:r>
+              <a:rPr lang="en-SG" sz="1000" b="1" dirty="0"/>
+              <a:t>Parent2</a:t>
+            </a:r>
+            <a:endParaRPr lang="en-SG" sz="1000" b="1" dirty="0" smtClean="0"/>
+          </a:p>
+          <a:p>
+            <a:r>
+              <a:rPr lang="en-SG" sz="1000" dirty="0" smtClean="0">
+                <a:solidFill>
+                  <a:schemeClr val="bg1">
+                    <a:lumMod val="50000"/>
+                  </a:schemeClr>
+                </a:solidFill>
+              </a:rPr>
+              <a:t>Person </a:t>
+            </a:r>
+            <a:r>
+              <a:rPr lang="en-SG" sz="1000" b="1" dirty="0" smtClean="0">
+                <a:solidFill>
+                  <a:schemeClr val="bg1">
+                    <a:lumMod val="50000"/>
+                  </a:schemeClr>
+                </a:solidFill>
+              </a:rPr>
+              <a:t>Partner</a:t>
+            </a:r>
+            <a:endParaRPr lang="en-SG" sz="1000" b="1" dirty="0">
+              <a:solidFill>
+                <a:schemeClr val="bg1">
+                  <a:lumMod val="50000"/>
+                </a:schemeClr>
+              </a:solidFill>
+            </a:endParaRPr>
+          </a:p>
+        </p:txBody>
+      </p:sp>
+      <p:sp>
+        <p:nvSpPr>
+          <p:cNvPr id="9" name="Rectangle 8"/>
+          <p:cNvSpPr/>
+          <p:nvPr/>
+        </p:nvSpPr>
+        <p:spPr>
+          <a:xfrm>
+            <a:off x="5148064" y="1779662"/>
+            <a:ext cx="1512168" cy="950570"/>
+          </a:xfrm>
+          <a:prstGeom prst="rect">
+            <a:avLst/>
+          </a:prstGeom>
+        </p:spPr>
+        <p:style>
+          <a:lnRef idx="1">
+            <a:schemeClr val="accent3"/>
+          </a:lnRef>
+          <a:fillRef idx="2">
+            <a:schemeClr val="accent3"/>
+          </a:fillRef>
+          <a:effectRef idx="1">
+            <a:schemeClr val="accent3"/>
+          </a:effectRef>
+          <a:fontRef idx="minor">
+            <a:schemeClr val="dk1"/>
+          </a:fontRef>
+        </p:style>
+        <p:txBody>
+          <a:bodyPr rtlCol="0" anchor="t"/>
+          <a:lstStyle/>
+          <a:p>
+            <a:r>
               <a:rPr lang="en-SG" sz="1000" b="1" dirty="0" smtClean="0"/>
+              <a:t>Person </a:t>
+            </a:r>
+          </a:p>
+          <a:p>
+            <a:r>
+              <a:rPr lang="en-SG" sz="1000" dirty="0" smtClean="0"/>
+              <a:t>Person </a:t>
+            </a:r>
+            <a:r>
+              <a:rPr lang="en-SG" sz="1000" b="1" dirty="0"/>
+              <a:t>Parent1</a:t>
+            </a:r>
+            <a:endParaRPr lang="en-SG" sz="1000" dirty="0" smtClean="0"/>
+          </a:p>
+          <a:p>
+            <a:r>
+              <a:rPr lang="en-SG" sz="1000" dirty="0" smtClean="0"/>
+              <a:t>Person </a:t>
+            </a:r>
+            <a:r>
+              <a:rPr lang="en-SG" sz="1000" b="1" dirty="0"/>
+              <a:t>Parent2</a:t>
+            </a:r>
+            <a:endParaRPr lang="en-SG" sz="1000" b="1" dirty="0" smtClean="0"/>
+          </a:p>
+          <a:p>
+            <a:r>
+              <a:rPr lang="en-SG" sz="1000" dirty="0" smtClean="0">
+                <a:solidFill>
+                  <a:schemeClr val="bg1">
+                    <a:lumMod val="50000"/>
+                  </a:schemeClr>
+                </a:solidFill>
+              </a:rPr>
+              <a:t>Person </a:t>
+            </a:r>
+            <a:r>
+              <a:rPr lang="en-SG" sz="1000" b="1" dirty="0" smtClean="0">
+                <a:solidFill>
+                  <a:schemeClr val="bg1">
+                    <a:lumMod val="50000"/>
+                  </a:schemeClr>
+                </a:solidFill>
+              </a:rPr>
               <a:t>Partner</a:t>
             </a:r>
-            <a:endParaRPr lang="en-SG" sz="1000" b="1" dirty="0"/>
+            <a:endParaRPr lang="en-SG" sz="1000" b="1" dirty="0">
+              <a:solidFill>
+                <a:schemeClr val="bg1">
+                  <a:lumMod val="50000"/>
+                </a:schemeClr>
+              </a:solidFill>
+            </a:endParaRPr>
+          </a:p>
+        </p:txBody>
+      </p:sp>
+      <p:sp>
+        <p:nvSpPr>
+          <p:cNvPr id="10" name="Rectangle 9"/>
+          <p:cNvSpPr/>
+          <p:nvPr/>
+        </p:nvSpPr>
+        <p:spPr>
+          <a:xfrm>
+            <a:off x="5148064" y="2931790"/>
+            <a:ext cx="1512168" cy="950570"/>
+          </a:xfrm>
+          <a:prstGeom prst="rect">
+            <a:avLst/>
+          </a:prstGeom>
+        </p:spPr>
+        <p:style>
+          <a:lnRef idx="1">
+            <a:schemeClr val="accent3"/>
+          </a:lnRef>
+          <a:fillRef idx="2">
+            <a:schemeClr val="accent3"/>
+          </a:fillRef>
+          <a:effectRef idx="1">
+            <a:schemeClr val="accent3"/>
+          </a:effectRef>
+          <a:fontRef idx="minor">
+            <a:schemeClr val="dk1"/>
+          </a:fontRef>
+        </p:style>
+        <p:txBody>
+          <a:bodyPr rtlCol="0" anchor="t"/>
+          <a:lstStyle/>
+          <a:p>
+            <a:r>
+              <a:rPr lang="en-SG" sz="1000" b="1" dirty="0" smtClean="0"/>
+              <a:t>Person </a:t>
+            </a:r>
+          </a:p>
+          <a:p>
+            <a:r>
+              <a:rPr lang="en-SG" sz="1000" dirty="0" smtClean="0"/>
+              <a:t>Person </a:t>
+            </a:r>
+            <a:r>
+              <a:rPr lang="en-SG" sz="1000" b="1" dirty="0"/>
+              <a:t>Parent1</a:t>
+            </a:r>
+            <a:endParaRPr lang="en-SG" sz="1000" dirty="0" smtClean="0"/>
+          </a:p>
+          <a:p>
+            <a:r>
+              <a:rPr lang="en-SG" sz="1000" dirty="0" smtClean="0">
+                <a:solidFill>
+                  <a:schemeClr val="bg1">
+                    <a:lumMod val="50000"/>
+                  </a:schemeClr>
+                </a:solidFill>
+              </a:rPr>
+              <a:t>Person </a:t>
+            </a:r>
+            <a:r>
+              <a:rPr lang="en-SG" sz="1000" b="1" dirty="0">
+                <a:solidFill>
+                  <a:schemeClr val="bg1">
+                    <a:lumMod val="50000"/>
+                  </a:schemeClr>
+                </a:solidFill>
+              </a:rPr>
+              <a:t>Parent2</a:t>
+            </a:r>
+            <a:endParaRPr lang="en-SG" sz="1000" b="1" dirty="0" smtClean="0">
+              <a:solidFill>
+                <a:schemeClr val="bg1">
+                  <a:lumMod val="50000"/>
+                </a:schemeClr>
+              </a:solidFill>
+            </a:endParaRPr>
+          </a:p>
+          <a:p>
+            <a:r>
+              <a:rPr lang="en-SG" sz="1000" dirty="0" smtClean="0">
+                <a:solidFill>
+                  <a:schemeClr val="bg1">
+                    <a:lumMod val="50000"/>
+                  </a:schemeClr>
+                </a:solidFill>
+              </a:rPr>
+              <a:t>Person </a:t>
+            </a:r>
+            <a:r>
+              <a:rPr lang="en-SG" sz="1000" b="1" dirty="0" smtClean="0">
+                <a:solidFill>
+                  <a:schemeClr val="bg1">
+                    <a:lumMod val="50000"/>
+                  </a:schemeClr>
+                </a:solidFill>
+              </a:rPr>
+              <a:t>Partner</a:t>
+            </a:r>
+            <a:endParaRPr lang="en-SG" sz="1000" b="1" dirty="0">
+              <a:solidFill>
+                <a:schemeClr val="bg1">
+                  <a:lumMod val="50000"/>
+                </a:schemeClr>
+              </a:solidFill>
+            </a:endParaRPr>
           </a:p>
         </p:txBody>
       </p:sp>
@@ -17976,15 +20450,13 @@
       <p:cxnSp>
         <p:nvCxnSpPr>
           <p:cNvPr id="27" name="Straight Arrow Connector 26"/>
-          <p:cNvCxnSpPr>
-            <a:stCxn id="10" idx="1"/>
-          </p:cNvCxnSpPr>
+          <p:cNvCxnSpPr/>
           <p:nvPr/>
         </p:nvCxnSpPr>
         <p:spPr>
           <a:xfrm flipH="1" flipV="1">
-            <a:off x="4427984" y="3126908"/>
-            <a:ext cx="720080" cy="280167"/>
+            <a:off x="4427984" y="3126909"/>
+            <a:ext cx="720080" cy="92913"/>
           </a:xfrm>
           <a:prstGeom prst="straightConnector1">
             <a:avLst/>
@@ -18059,14 +20531,32 @@
           <a:lstStyle/>
           <a:p>
             <a:r>
-              <a:rPr lang="en-SG" sz="1000" dirty="0" smtClean="0"/>
+              <a:rPr lang="en-SG" sz="1000" dirty="0" smtClean="0">
+                <a:solidFill>
+                  <a:schemeClr val="bg1">
+                    <a:lumMod val="50000"/>
+                  </a:schemeClr>
+                </a:solidFill>
+              </a:rPr>
               <a:t>List&lt;Person&gt;</a:t>
             </a:r>
             <a:r>
-              <a:rPr lang="en-SG" sz="1000" b="1" dirty="0" smtClean="0"/>
+              <a:rPr lang="en-SG" sz="1000" b="1" dirty="0" smtClean="0">
+                <a:solidFill>
+                  <a:schemeClr val="bg1">
+                    <a:lumMod val="50000"/>
+                  </a:schemeClr>
+                </a:solidFill>
+              </a:rPr>
               <a:t> Children</a:t>
             </a:r>
-            <a:endParaRPr lang="en-SG" sz="1000" dirty="0"/>
+            <a:endParaRPr lang="en-SG" sz="1000" dirty="0">
+              <a:solidFill>
+                <a:schemeClr val="bg1">
+                  <a:lumMod val="50000"/>
+                </a:schemeClr>
+              </a:solidFill>
+            </a:endParaRPr>
           </a:p>
         </p:txBody>
       </p:sp>
@@ -18121,14 +20611,32 @@
           <a:lstStyle/>
           <a:p>
             <a:r>
-              <a:rPr lang="en-SG" sz="1000" dirty="0" smtClean="0"/>
+              <a:rPr lang="en-SG" sz="1000" dirty="0" smtClean="0">
+                <a:solidFill>
+                  <a:schemeClr val="bg1">
+                    <a:lumMod val="50000"/>
+                  </a:schemeClr>
+                </a:solidFill>
+              </a:rPr>
               <a:t>List&lt;Person&gt;</a:t>
             </a:r>
             <a:r>
-              <a:rPr lang="en-SG" sz="1000" b="1" dirty="0" smtClean="0"/>
+              <a:rPr lang="en-SG" sz="1000" b="1" dirty="0" smtClean="0">
+                <a:solidFill>
+                  <a:schemeClr val="bg1">
+                    <a:lumMod val="50000"/>
+                  </a:schemeClr>
+                </a:solidFill>
+              </a:rPr>
               <a:t> Children</a:t>
             </a:r>
-            <a:endParaRPr lang="en-SG" sz="1000" dirty="0"/>
+            <a:endParaRPr lang="en-SG" sz="1000" dirty="0">
+              <a:solidFill>
+                <a:schemeClr val="bg1">
+                  <a:lumMod val="50000"/>
+                </a:schemeClr>
+              </a:solidFill>
+            </a:endParaRPr>
           </a:p>
         </p:txBody>
       </p:sp>
@@ -18183,14 +20691,32 @@
           <a:lstStyle/>
           <a:p>
             <a:r>
-              <a:rPr lang="en-SG" sz="1000" dirty="0" smtClean="0"/>
+              <a:rPr lang="en-SG" sz="1000" dirty="0" smtClean="0">
+                <a:solidFill>
+                  <a:schemeClr val="bg1">
+                    <a:lumMod val="50000"/>
+                  </a:schemeClr>
+                </a:solidFill>
+              </a:rPr>
               <a:t>List&lt;Person&gt;</a:t>
             </a:r>
             <a:r>
-              <a:rPr lang="en-SG" sz="1000" b="1" dirty="0" smtClean="0"/>
+              <a:rPr lang="en-SG" sz="1000" b="1" dirty="0" smtClean="0">
+                <a:solidFill>
+                  <a:schemeClr val="bg1">
+                    <a:lumMod val="50000"/>
+                  </a:schemeClr>
+                </a:solidFill>
+              </a:rPr>
               <a:t> Children</a:t>
             </a:r>
-            <a:endParaRPr lang="en-SG" sz="1000" dirty="0"/>
+            <a:endParaRPr lang="en-SG" sz="1000" dirty="0">
+              <a:solidFill>
+                <a:schemeClr val="bg1">
+                  <a:lumMod val="50000"/>
+                </a:schemeClr>
+              </a:solidFill>
+            </a:endParaRPr>
           </a:p>
         </p:txBody>
       </p:sp>
@@ -18237,7 +20763,7 @@
 </p:sld>
 </file>
 
-<file path=ppt/slides/slide7.xml><?xml version="1.0" encoding="utf-8"?>
+<file path=ppt/slides/slide8.xml><?xml version="1.0" encoding="utf-8"?>
 <p:sld xmlns:a="http://schemas.openxmlformats.org/drawingml/2006/main" xmlns:r="http://schemas.openxmlformats.org/officeDocument/2006/relationships" xmlns:p="http://schemas.openxmlformats.org/presentationml/2006/main">
   <p:cSld>
     <p:spTree>
@@ -20857,288 +23383,6 @@
 </p:sld>
 </file>
 
-<file path=ppt/slides/slide8.xml><?xml version="1.0" encoding="utf-8"?>
-<p:sld xmlns:a="http://schemas.openxmlformats.org/drawingml/2006/main" xmlns:r="http://schemas.openxmlformats.org/officeDocument/2006/relationships" xmlns:p="http://schemas.openxmlformats.org/presentationml/2006/main">
-  <p:cSld>
-    <p:spTree>
-      <p:nvGrpSpPr>
-        <p:cNvPr id="1" name=""/>
-        <p:cNvGrpSpPr/>
-        <p:nvPr/>
-      </p:nvGrpSpPr>
-      <p:grpSpPr>
-        <a:xfrm>
-          <a:off x="0" y="0"/>
-          <a:ext cx="0" cy="0"/>
-          <a:chOff x="0" y="0"/>
-          <a:chExt cx="0" cy="0"/>
-        </a:xfrm>
-      </p:grpSpPr>
-      <p:sp>
-        <p:nvSpPr>
-          <p:cNvPr id="4" name="TextBox 3"/>
-          <p:cNvSpPr txBox="1"/>
-          <p:nvPr/>
-        </p:nvSpPr>
-        <p:spPr>
-          <a:xfrm>
-            <a:off x="3619334" y="627535"/>
-            <a:ext cx="987195" cy="646331"/>
-          </a:xfrm>
-          <a:prstGeom prst="rect">
-            <a:avLst/>
-          </a:prstGeom>
-        </p:spPr>
-        <p:style>
-          <a:lnRef idx="1">
-            <a:schemeClr val="dk1"/>
-          </a:lnRef>
-          <a:fillRef idx="2">
-            <a:schemeClr val="dk1"/>
-          </a:fillRef>
-          <a:effectRef idx="1">
-            <a:schemeClr val="dk1"/>
-          </a:effectRef>
-          <a:fontRef idx="minor">
-            <a:schemeClr val="dk1"/>
-          </a:fontRef>
-        </p:style>
-        <p:txBody>
-          <a:bodyPr wrap="square" rtlCol="0">
-            <a:spAutoFit/>
-          </a:bodyPr>
-          <a:lstStyle/>
-          <a:p>
-            <a:r>
-              <a:rPr lang="en-GB" b="1" dirty="0" smtClean="0"/>
-              <a:t>Parent</a:t>
-            </a:r>
-          </a:p>
-          <a:p>
-            <a:r>
-              <a:rPr lang="en-GB" dirty="0" smtClean="0"/>
-              <a:t>Children</a:t>
-            </a:r>
-            <a:endParaRPr lang="en-GB" dirty="0"/>
-          </a:p>
-        </p:txBody>
-      </p:sp>
-      <p:sp>
-        <p:nvSpPr>
-          <p:cNvPr id="6" name="TextBox 5"/>
-          <p:cNvSpPr txBox="1"/>
-          <p:nvPr/>
-        </p:nvSpPr>
-        <p:spPr>
-          <a:xfrm>
-            <a:off x="3619334" y="1599643"/>
-            <a:ext cx="987195" cy="646331"/>
-          </a:xfrm>
-          <a:prstGeom prst="rect">
-            <a:avLst/>
-          </a:prstGeom>
-        </p:spPr>
-        <p:style>
-          <a:lnRef idx="1">
-            <a:schemeClr val="dk1"/>
-          </a:lnRef>
-          <a:fillRef idx="2">
-            <a:schemeClr val="dk1"/>
-          </a:fillRef>
-          <a:effectRef idx="1">
-            <a:schemeClr val="dk1"/>
-          </a:effectRef>
-          <a:fontRef idx="minor">
-            <a:schemeClr val="dk1"/>
-          </a:fontRef>
-        </p:style>
-        <p:txBody>
-          <a:bodyPr wrap="square" rtlCol="0">
-            <a:spAutoFit/>
-          </a:bodyPr>
-          <a:lstStyle/>
-          <a:p>
-            <a:r>
-              <a:rPr lang="en-GB" b="1" dirty="0" smtClean="0"/>
-              <a:t>Child</a:t>
-            </a:r>
-          </a:p>
-          <a:p>
-            <a:r>
-              <a:rPr lang="en-GB" dirty="0" smtClean="0"/>
-              <a:t>Parent</a:t>
-            </a:r>
-          </a:p>
-        </p:txBody>
-      </p:sp>
-      <p:cxnSp>
-        <p:nvCxnSpPr>
-          <p:cNvPr id="8" name="Straight Arrow Connector 7"/>
-          <p:cNvCxnSpPr>
-            <a:stCxn id="4" idx="2"/>
-            <a:endCxn id="6" idx="0"/>
-          </p:cNvCxnSpPr>
-          <p:nvPr/>
-        </p:nvCxnSpPr>
-        <p:spPr>
-          <a:xfrm>
-            <a:off x="4112932" y="1273866"/>
-            <a:ext cx="0" cy="325777"/>
-          </a:xfrm>
-          <a:prstGeom prst="straightConnector1">
-            <a:avLst/>
-          </a:prstGeom>
-          <a:ln>
-            <a:tailEnd type="arrow"/>
-          </a:ln>
-        </p:spPr>
-        <p:style>
-          <a:lnRef idx="1">
-            <a:schemeClr val="accent1"/>
-          </a:lnRef>
-          <a:fillRef idx="0">
-            <a:schemeClr val="accent1"/>
-          </a:fillRef>
-          <a:effectRef idx="0">
-            <a:schemeClr val="accent1"/>
-          </a:effectRef>
-          <a:fontRef idx="minor">
-            <a:schemeClr val="tx1"/>
-          </a:fontRef>
-        </p:style>
-      </p:cxnSp>
-      <p:sp>
-        <p:nvSpPr>
-          <p:cNvPr id="12" name="TextBox 11"/>
-          <p:cNvSpPr txBox="1"/>
-          <p:nvPr/>
-        </p:nvSpPr>
-        <p:spPr>
-          <a:xfrm>
-            <a:off x="683569" y="735546"/>
-            <a:ext cx="2636747" cy="923330"/>
-          </a:xfrm>
-          <a:prstGeom prst="rect">
-            <a:avLst/>
-          </a:prstGeom>
-          <a:noFill/>
-        </p:spPr>
-        <p:txBody>
-          <a:bodyPr wrap="none" rtlCol="0">
-            <a:spAutoFit/>
-          </a:bodyPr>
-          <a:lstStyle/>
-          <a:p>
-            <a:r>
-              <a:rPr lang="en-GB" dirty="0" err="1" smtClean="0"/>
-              <a:t>createStore</a:t>
-            </a:r>
-            <a:r>
-              <a:rPr lang="en-GB" dirty="0" smtClean="0"/>
-              <a:t>(Parent)</a:t>
-            </a:r>
-          </a:p>
-          <a:p>
-            <a:r>
-              <a:rPr lang="en-GB" dirty="0" err="1" smtClean="0"/>
-              <a:t>createStore</a:t>
-            </a:r>
-            <a:r>
-              <a:rPr lang="en-GB" dirty="0"/>
-              <a:t>(</a:t>
-            </a:r>
-            <a:r>
-              <a:rPr lang="en-GB" dirty="0" smtClean="0"/>
-              <a:t>Child(Parent))</a:t>
-            </a:r>
-          </a:p>
-          <a:p>
-            <a:r>
-              <a:rPr lang="en-GB" dirty="0" smtClean="0"/>
-              <a:t> adds Child to Parent</a:t>
-            </a:r>
-            <a:endParaRPr lang="en-GB" dirty="0"/>
-          </a:p>
-        </p:txBody>
-      </p:sp>
-      <p:sp>
-        <p:nvSpPr>
-          <p:cNvPr id="13" name="TextBox 12"/>
-          <p:cNvSpPr txBox="1"/>
-          <p:nvPr/>
-        </p:nvSpPr>
-        <p:spPr>
-          <a:xfrm>
-            <a:off x="5110584" y="849846"/>
-            <a:ext cx="2176109" cy="1477328"/>
-          </a:xfrm>
-          <a:prstGeom prst="rect">
-            <a:avLst/>
-          </a:prstGeom>
-          <a:noFill/>
-        </p:spPr>
-        <p:txBody>
-          <a:bodyPr wrap="none" rtlCol="0">
-            <a:spAutoFit/>
-          </a:bodyPr>
-          <a:lstStyle/>
-          <a:p>
-            <a:r>
-              <a:rPr lang="en-GB" dirty="0" smtClean="0"/>
-              <a:t>Create(Parent)</a:t>
-            </a:r>
-          </a:p>
-          <a:p>
-            <a:r>
-              <a:rPr lang="en-GB" dirty="0" smtClean="0"/>
-              <a:t>Create(Child(Parent))</a:t>
-            </a:r>
-          </a:p>
-          <a:p>
-            <a:r>
-              <a:rPr lang="en-GB" dirty="0" smtClean="0"/>
-              <a:t>Store(Parent)</a:t>
-            </a:r>
-          </a:p>
-          <a:p>
-            <a:r>
-              <a:rPr lang="en-GB" dirty="0" smtClean="0"/>
-              <a:t>Store(Child)</a:t>
-            </a:r>
-          </a:p>
-          <a:p>
-            <a:r>
-              <a:rPr lang="en-GB" dirty="0"/>
-              <a:t> </a:t>
-            </a:r>
-            <a:r>
-              <a:rPr lang="en-GB" dirty="0" smtClean="0"/>
-              <a:t> adds Child to Parent</a:t>
-            </a:r>
-            <a:endParaRPr lang="en-GB" dirty="0"/>
-          </a:p>
-        </p:txBody>
-      </p:sp>
-    </p:spTree>
-    <p:extLst>
-      <p:ext uri="{BB962C8B-B14F-4D97-AF65-F5344CB8AC3E}">
-        <p14:creationId xmlns:p14="http://schemas.microsoft.com/office/powerpoint/2010/main" val="3242916918"/>
-      </p:ext>
-    </p:extLst>
-  </p:cSld>
-  <p:clrMapOvr>
-    <a:masterClrMapping/>
-  </p:clrMapOvr>
-  <p:timing>
-    <p:tnLst>
-      <p:par>
-        <p:cTn id="1" dur="indefinite" restart="never" nodeType="tmRoot"/>
-      </p:par>
-    </p:tnLst>
-  </p:timing>
-</p:sld>
-</file>
-
 <file path=ppt/slides/slide9.xml><?xml version="1.0" encoding="utf-8"?>
 <p:sld xmlns:a="http://schemas.openxmlformats.org/drawingml/2006/main" xmlns:r="http://schemas.openxmlformats.org/officeDocument/2006/relationships" xmlns:p="http://schemas.openxmlformats.org/presentationml/2006/main">
   <p:cSld>
@@ -21158,13 +23402,13 @@
       </p:grpSpPr>
       <p:sp>
         <p:nvSpPr>
-          <p:cNvPr id="7" name="TextBox 6"/>
+          <p:cNvPr id="4" name="TextBox 3"/>
           <p:cNvSpPr txBox="1"/>
           <p:nvPr/>
         </p:nvSpPr>
         <p:spPr>
           <a:xfrm>
-            <a:off x="3275857" y="465517"/>
+            <a:off x="3619334" y="627535"/>
             <a:ext cx="987195" cy="646331"/>
           </a:xfrm>
           <a:prstGeom prst="rect">
@@ -21207,14 +23451,14 @@
       </p:sp>
       <p:sp>
         <p:nvSpPr>
-          <p:cNvPr id="8" name="TextBox 7"/>
+          <p:cNvPr id="6" name="TextBox 5"/>
           <p:cNvSpPr txBox="1"/>
           <p:nvPr/>
         </p:nvSpPr>
         <p:spPr>
           <a:xfrm>
-            <a:off x="3907366" y="1437624"/>
-            <a:ext cx="987195" cy="923330"/>
+            <a:off x="3619334" y="1599643"/>
+            <a:ext cx="987195" cy="646331"/>
           </a:xfrm>
           <a:prstGeom prst="rect">
             <a:avLst/>
@@ -21248,30 +23492,24 @@
           <a:p>
             <a:r>
               <a:rPr lang="en-GB" dirty="0" smtClean="0"/>
-              <a:t>Parent1</a:t>
-            </a:r>
-          </a:p>
-          <a:p>
-            <a:r>
-              <a:rPr lang="en-GB" dirty="0" smtClean="0"/>
-              <a:t>Parent2</a:t>
+              <a:t>Parent</a:t>
             </a:r>
           </a:p>
         </p:txBody>
       </p:sp>
       <p:cxnSp>
         <p:nvCxnSpPr>
-          <p:cNvPr id="9" name="Straight Arrow Connector 8"/>
+          <p:cNvPr id="8" name="Straight Arrow Connector 7"/>
           <p:cNvCxnSpPr>
-            <a:stCxn id="7" idx="2"/>
-            <a:endCxn id="8" idx="0"/>
+            <a:stCxn id="4" idx="2"/>
+            <a:endCxn id="6" idx="0"/>
           </p:cNvCxnSpPr>
           <p:nvPr/>
         </p:nvCxnSpPr>
         <p:spPr>
           <a:xfrm>
-            <a:off x="3769455" y="1111848"/>
-            <a:ext cx="631509" cy="325776"/>
+            <a:off x="4112932" y="1273866"/>
+            <a:ext cx="0" cy="325777"/>
           </a:xfrm>
           <a:prstGeom prst="straightConnector1">
             <a:avLst/>
@@ -21297,14 +23535,14 @@
       </p:cxnSp>
       <p:sp>
         <p:nvSpPr>
-          <p:cNvPr id="10" name="TextBox 9"/>
+          <p:cNvPr id="12" name="TextBox 11"/>
           <p:cNvSpPr txBox="1"/>
           <p:nvPr/>
         </p:nvSpPr>
         <p:spPr>
           <a:xfrm>
-            <a:off x="179513" y="627534"/>
-            <a:ext cx="3594895" cy="1200329"/>
+            <a:off x="683569" y="735546"/>
+            <a:ext cx="2636747" cy="923330"/>
           </a:xfrm>
           <a:prstGeom prst="rect">
             <a:avLst/>
@@ -21323,7 +23561,7 @@
             </a:r>
             <a:r>
               <a:rPr lang="en-GB" dirty="0" smtClean="0"/>
-              <a:t>(Parent1)</a:t>
+              <a:t>(Parent)</a:t>
             </a:r>
           </a:p>
           <a:p>
@@ -21332,24 +23570,18 @@
               <a:t>createStore</a:t>
             </a:r>
             <a:r>
+              <a:rPr lang="en-GB" dirty="0"/>
+              <a:t>(</a:t>
+            </a:r>
+            <a:r>
               <a:rPr lang="en-GB" dirty="0" smtClean="0"/>
-              <a:t>(Parent2)</a:t>
-            </a:r>
-          </a:p>
-          <a:p>
-            <a:r>
-              <a:rPr lang="en-GB" dirty="0" err="1" smtClean="0"/>
-              <a:t>createStore</a:t>
-            </a:r>
+              <a:t>Child(Parent))</a:t>
+            </a:r>
+          </a:p>
+          <a:p>
             <a:r>
               <a:rPr lang="en-GB" dirty="0" smtClean="0"/>
-              <a:t>(Child(Parent1, Parent2))</a:t>
-            </a:r>
-          </a:p>
-          <a:p>
-            <a:r>
-              <a:rPr lang="en-GB" dirty="0" smtClean="0"/>
-              <a:t> adds Child to Parent1 and Parent2</a:t>
+              <a:t> adds Child to Parent</a:t>
             </a:r>
             <a:endParaRPr lang="en-GB" dirty="0"/>
           </a:p>
@@ -21357,131 +23589,14 @@
       </p:sp>
       <p:sp>
         <p:nvSpPr>
-          <p:cNvPr id="11" name="TextBox 10"/>
+          <p:cNvPr id="13" name="TextBox 12"/>
           <p:cNvSpPr txBox="1"/>
           <p:nvPr/>
         </p:nvSpPr>
         <p:spPr>
           <a:xfrm>
-            <a:off x="323528" y="2988697"/>
-            <a:ext cx="8640960" cy="2031325"/>
-          </a:xfrm>
-          <a:prstGeom prst="rect">
-            <a:avLst/>
-          </a:prstGeom>
-          <a:noFill/>
-        </p:spPr>
-        <p:txBody>
-          <a:bodyPr wrap="square" rtlCol="0">
-            <a:spAutoFit/>
-          </a:bodyPr>
-          <a:lstStyle/>
-          <a:p>
-            <a:r>
-              <a:rPr lang="en-GB" dirty="0" smtClean="0"/>
-              <a:t>Unfortunately, there are to many strange cases to be solved, when a not stored child can be added to a not stored parent, for example if the child belongs to 2 parents. If it has only 1 parent, the child could get saved when the parent gets saved. But when it has 2 parents and the first parent tries to save the child before the second parent is saved, that wouldn’t work, because parent 2 has to be saved before child 2 can get saved, which needs to know the key of parent 2.</a:t>
-            </a:r>
-          </a:p>
-          <a:p>
-            <a:endParaRPr lang="en-GB" dirty="0"/>
-          </a:p>
-        </p:txBody>
-      </p:sp>
-      <p:sp>
-        <p:nvSpPr>
-          <p:cNvPr id="12" name="TextBox 11"/>
-          <p:cNvSpPr txBox="1"/>
-          <p:nvPr/>
-        </p:nvSpPr>
-        <p:spPr>
-          <a:xfrm>
-            <a:off x="4520910" y="465517"/>
-            <a:ext cx="987195" cy="646331"/>
-          </a:xfrm>
-          <a:prstGeom prst="rect">
-            <a:avLst/>
-          </a:prstGeom>
-        </p:spPr>
-        <p:style>
-          <a:lnRef idx="1">
-            <a:schemeClr val="dk1"/>
-          </a:lnRef>
-          <a:fillRef idx="2">
-            <a:schemeClr val="dk1"/>
-          </a:fillRef>
-          <a:effectRef idx="1">
-            <a:schemeClr val="dk1"/>
-          </a:effectRef>
-          <a:fontRef idx="minor">
-            <a:schemeClr val="dk1"/>
-          </a:fontRef>
-        </p:style>
-        <p:txBody>
-          <a:bodyPr wrap="square" rtlCol="0">
-            <a:spAutoFit/>
-          </a:bodyPr>
-          <a:lstStyle/>
-          <a:p>
-            <a:r>
-              <a:rPr lang="en-GB" b="1" dirty="0" smtClean="0"/>
-              <a:t>Parent</a:t>
-            </a:r>
-          </a:p>
-          <a:p>
-            <a:r>
-              <a:rPr lang="en-GB" dirty="0" smtClean="0"/>
-              <a:t>Children</a:t>
-            </a:r>
-            <a:endParaRPr lang="en-GB" dirty="0"/>
-          </a:p>
-        </p:txBody>
-      </p:sp>
-      <p:cxnSp>
-        <p:nvCxnSpPr>
-          <p:cNvPr id="13" name="Straight Arrow Connector 12"/>
-          <p:cNvCxnSpPr>
-            <a:stCxn id="12" idx="2"/>
-            <a:endCxn id="8" idx="0"/>
-          </p:cNvCxnSpPr>
-          <p:nvPr/>
-        </p:nvCxnSpPr>
-        <p:spPr>
-          <a:xfrm flipH="1">
-            <a:off x="4400964" y="1111848"/>
-            <a:ext cx="613544" cy="325776"/>
-          </a:xfrm>
-          <a:prstGeom prst="straightConnector1">
-            <a:avLst/>
-          </a:prstGeom>
-          <a:ln>
-            <a:tailEnd type="arrow"/>
-          </a:ln>
-        </p:spPr>
-        <p:style>
-          <a:lnRef idx="1">
-            <a:schemeClr val="accent1"/>
-          </a:lnRef>
-          <a:fillRef idx="0">
-            <a:schemeClr val="accent1"/>
-          </a:fillRef>
-          <a:effectRef idx="0">
-            <a:schemeClr val="accent1"/>
-          </a:effectRef>
-          <a:fontRef idx="minor">
-            <a:schemeClr val="tx1"/>
-          </a:fontRef>
-        </p:style>
-      </p:cxnSp>
-      <p:sp>
-        <p:nvSpPr>
-          <p:cNvPr id="14" name="TextBox 13"/>
-          <p:cNvSpPr txBox="1"/>
-          <p:nvPr/>
-        </p:nvSpPr>
-        <p:spPr>
-          <a:xfrm>
-            <a:off x="5657626" y="627534"/>
-            <a:ext cx="3430811" cy="2308324"/>
+            <a:off x="5110584" y="849846"/>
+            <a:ext cx="2176109" cy="1477328"/>
           </a:xfrm>
           <a:prstGeom prst="rect">
             <a:avLst/>
@@ -21496,53 +23611,35 @@
           <a:p>
             <a:r>
               <a:rPr lang="en-GB" dirty="0" smtClean="0"/>
-              <a:t>create (Parent1)</a:t>
+              <a:t>Create(Parent)</a:t>
+            </a:r>
+          </a:p>
+          <a:p>
+            <a:r>
+              <a:rPr lang="en-GB" dirty="0" smtClean="0"/>
+              <a:t>Create(Child(Parent))</a:t>
+            </a:r>
+          </a:p>
+          <a:p>
+            <a:r>
+              <a:rPr lang="en-GB" dirty="0" smtClean="0"/>
+              <a:t>Store(Parent)</a:t>
+            </a:r>
+          </a:p>
+          <a:p>
+            <a:r>
+              <a:rPr lang="en-GB" dirty="0" smtClean="0"/>
+              <a:t>Store(Child)</a:t>
             </a:r>
           </a:p>
           <a:p>
             <a:r>
               <a:rPr lang="en-GB" dirty="0"/>
-              <a:t>s</a:t>
+              <a:t> </a:t>
             </a:r>
             <a:r>
               <a:rPr lang="en-GB" dirty="0" smtClean="0"/>
-              <a:t>tore(Parent1)</a:t>
-            </a:r>
-          </a:p>
-          <a:p>
-            <a:r>
-              <a:rPr lang="en-GB" dirty="0" smtClean="0"/>
-              <a:t>create (Parent2)</a:t>
-            </a:r>
-          </a:p>
-          <a:p>
-            <a:r>
-              <a:rPr lang="en-GB" dirty="0" smtClean="0"/>
-              <a:t>create (Child(Parent1, Parent2))</a:t>
-            </a:r>
-          </a:p>
-          <a:p>
-            <a:r>
-              <a:rPr lang="en-GB" dirty="0" smtClean="0"/>
-              <a:t>/*store child not possible*/</a:t>
-            </a:r>
-          </a:p>
-          <a:p>
-            <a:r>
-              <a:rPr lang="en-GB" dirty="0" smtClean="0"/>
-              <a:t>store(Parent2)</a:t>
-            </a:r>
-          </a:p>
-          <a:p>
-            <a:r>
-              <a:rPr lang="en-GB" dirty="0" smtClean="0"/>
-              <a:t>store(Child)</a:t>
-            </a:r>
-          </a:p>
-          <a:p>
-            <a:r>
-              <a:rPr lang="en-GB" dirty="0" smtClean="0"/>
-              <a:t> adds Child to Parent1 and Parent2</a:t>
+              <a:t> adds Child to Parent</a:t>
             </a:r>
             <a:endParaRPr lang="en-GB" dirty="0"/>
           </a:p>
@@ -21551,7 +23648,7 @@
     </p:spTree>
     <p:extLst>
       <p:ext uri="{BB962C8B-B14F-4D97-AF65-F5344CB8AC3E}">
-        <p14:creationId xmlns:p14="http://schemas.microsoft.com/office/powerpoint/2010/main" val="1310231843"/>
+        <p14:creationId xmlns:p14="http://schemas.microsoft.com/office/powerpoint/2010/main" val="3242916918"/>
       </p:ext>
     </p:extLst>
   </p:cSld>

</xml_diff>